<commit_message>
poster draft in 4 columns
</commit_message>
<xml_diff>
--- a/poster/Poster_Bubbles.pptx
+++ b/poster/Poster_Bubbles.pptx
@@ -376,7 +376,7 @@
             <a:fld id="{E6CC2317-6751-4CD4-9995-8782DD78E936}" type="datetimeFigureOut">
               <a:rPr lang="en-US" smtClean="0"/>
               <a:pPr/>
-              <a:t>5/9/2021</a:t>
+              <a:t>5/14/2021</a:t>
             </a:fld>
             <a:endParaRPr lang="en-US" dirty="0"/>
           </a:p>
@@ -17453,8 +17453,8 @@
         </p:blipFill>
         <p:spPr bwMode="auto">
           <a:xfrm>
-            <a:off x="-336399" y="354450"/>
-            <a:ext cx="5343134" cy="1753833"/>
+            <a:off x="2390714" y="1091482"/>
+            <a:ext cx="3184011" cy="1045121"/>
           </a:xfrm>
           <a:prstGeom prst="rect">
             <a:avLst/>
@@ -17494,14 +17494,14 @@
           <a:lstStyle/>
           <a:p>
             <a:r>
-              <a:rPr lang="en-US" sz="2400" dirty="0"/>
-              <a:t>Social media:</a:t>
+              <a:rPr lang="en-US" sz="2400" b="1" dirty="0"/>
+              <a:t>Observations</a:t>
             </a:r>
           </a:p>
           <a:p>
             <a:pPr marL="342900" indent="-342900">
-              <a:buFontTx/>
-              <a:buChar char="-"/>
+              <a:buFont typeface="Arial" panose="020B0604020202020204" pitchFamily="34" charset="0"/>
+              <a:buChar char="•"/>
             </a:pPr>
             <a:r>
               <a:rPr lang="en-US" sz="2400" dirty="0">
@@ -17545,9 +17545,9 @@
             </a:r>
           </a:p>
           <a:p>
-            <a:pPr marL="285750" indent="-285750">
-              <a:buFontTx/>
-              <a:buChar char="-"/>
+            <a:pPr marL="342900" indent="-342900">
+              <a:buFont typeface="Arial" panose="020B0604020202020204" pitchFamily="34" charset="0"/>
+              <a:buChar char="•"/>
             </a:pPr>
             <a:r>
               <a:rPr lang="en-US" sz="2400" dirty="0"/>
@@ -17567,9 +17567,9 @@
             </a:r>
           </a:p>
           <a:p>
-            <a:pPr marL="285750" indent="-285750">
-              <a:buFontTx/>
-              <a:buChar char="-"/>
+            <a:pPr marL="342900" indent="-342900">
+              <a:buFont typeface="Arial" panose="020B0604020202020204" pitchFamily="34" charset="0"/>
+              <a:buChar char="•"/>
             </a:pPr>
             <a:r>
               <a:rPr lang="en-US" sz="2400" dirty="0"/>
@@ -17593,14 +17593,14 @@
           </a:p>
           <a:p>
             <a:r>
-              <a:rPr lang="en-US" sz="2400" dirty="0"/>
-              <a:t>Filter bubble:</a:t>
+              <a:rPr lang="en-US" sz="2400" b="1" dirty="0"/>
+              <a:t>Creation of filter bubbles!</a:t>
             </a:r>
           </a:p>
           <a:p>
             <a:pPr marL="342900" indent="-342900">
-              <a:buFontTx/>
-              <a:buChar char="-"/>
+              <a:buFont typeface="Arial" panose="020B0604020202020204" pitchFamily="34" charset="0"/>
+              <a:buChar char="•"/>
             </a:pPr>
             <a:r>
               <a:rPr lang="en-US" sz="2400" dirty="0"/>
@@ -17613,8 +17613,8 @@
           </a:p>
           <a:p>
             <a:pPr marL="342900" indent="-342900">
-              <a:buFontTx/>
-              <a:buChar char="-"/>
+              <a:buFont typeface="Arial" panose="020B0604020202020204" pitchFamily="34" charset="0"/>
+              <a:buChar char="•"/>
             </a:pPr>
             <a:r>
               <a:rPr lang="en-US" sz="2400" dirty="0"/>
@@ -17623,8 +17623,8 @@
           </a:p>
           <a:p>
             <a:pPr marL="342900" indent="-342900">
-              <a:buFontTx/>
-              <a:buChar char="-"/>
+              <a:buFont typeface="Arial" panose="020B0604020202020204" pitchFamily="34" charset="0"/>
+              <a:buChar char="•"/>
             </a:pPr>
             <a:r>
               <a:rPr lang="en-US" sz="2400" dirty="0"/>
@@ -17637,8 +17637,8 @@
           </a:p>
           <a:p>
             <a:pPr marL="342900" indent="-342900">
-              <a:buFontTx/>
-              <a:buChar char="-"/>
+              <a:buFont typeface="Arial" panose="020B0604020202020204" pitchFamily="34" charset="0"/>
+              <a:buChar char="•"/>
             </a:pPr>
             <a:r>
               <a:rPr lang="en-US" sz="2400" dirty="0"/>
@@ -17673,16 +17673,25 @@
         <p:spPr>
           <a:xfrm>
             <a:off x="602791" y="2595415"/>
-            <a:ext cx="9048751" cy="536406"/>
+            <a:ext cx="9089468" cy="536406"/>
           </a:xfrm>
+          <a:solidFill>
+            <a:schemeClr val="accent1">
+              <a:lumMod val="75000"/>
+            </a:schemeClr>
+          </a:solidFill>
         </p:spPr>
         <p:txBody>
           <a:bodyPr/>
           <a:lstStyle/>
           <a:p>
             <a:r>
-              <a:rPr lang="en-US" sz="2800" dirty="0"/>
-              <a:t>Introduction</a:t>
+              <a:rPr lang="en-US" sz="2800" u="none" dirty="0">
+                <a:solidFill>
+                  <a:schemeClr val="bg1"/>
+                </a:solidFill>
+              </a:rPr>
+              <a:t>Social media usage increases polarization!</a:t>
             </a:r>
           </a:p>
         </p:txBody>
@@ -17705,8 +17714,8 @@
           <a:lstStyle/>
           <a:p>
             <a:pPr marL="342900" indent="-342900">
-              <a:buFontTx/>
-              <a:buChar char="-"/>
+              <a:buFont typeface="Arial" panose="020B0604020202020204" pitchFamily="34" charset="0"/>
+              <a:buChar char="•"/>
             </a:pPr>
             <a:r>
               <a:rPr lang="en-US" sz="2400" dirty="0">
@@ -17721,8 +17730,8 @@
           </a:p>
           <a:p>
             <a:pPr marL="342900" indent="-342900">
-              <a:buFontTx/>
-              <a:buChar char="-"/>
+              <a:buFont typeface="Arial" panose="020B0604020202020204" pitchFamily="34" charset="0"/>
+              <a:buChar char="•"/>
             </a:pPr>
             <a:r>
               <a:rPr lang="en-US" sz="2400" dirty="0">
@@ -17737,8 +17746,8 @@
           </a:p>
           <a:p>
             <a:pPr marL="342900" indent="-342900">
-              <a:buFontTx/>
-              <a:buChar char="-"/>
+              <a:buFont typeface="Arial" panose="020B0604020202020204" pitchFamily="34" charset="0"/>
+              <a:buChar char="•"/>
             </a:pPr>
             <a:r>
               <a:rPr lang="en-US" sz="2400" dirty="0"/>
@@ -17747,8 +17756,8 @@
           </a:p>
           <a:p>
             <a:pPr marL="342900" indent="-342900">
-              <a:buFontTx/>
-              <a:buChar char="-"/>
+              <a:buFont typeface="Arial" panose="020B0604020202020204" pitchFamily="34" charset="0"/>
+              <a:buChar char="•"/>
             </a:pPr>
             <a:r>
               <a:rPr lang="en-US" sz="2400" dirty="0"/>
@@ -17757,8 +17766,8 @@
           </a:p>
           <a:p>
             <a:pPr marL="342900" indent="-342900">
-              <a:buFontTx/>
-              <a:buChar char="-"/>
+              <a:buFont typeface="Arial" panose="020B0604020202020204" pitchFamily="34" charset="0"/>
+              <a:buChar char="•"/>
             </a:pPr>
             <a:r>
               <a:rPr lang="en-US" sz="2400" dirty="0">
@@ -17793,8 +17802,8 @@
           </a:p>
           <a:p>
             <a:pPr marL="342900" indent="-342900">
-              <a:buFontTx/>
-              <a:buChar char="-"/>
+              <a:buFont typeface="Arial" panose="020B0604020202020204" pitchFamily="34" charset="0"/>
+              <a:buChar char="•"/>
             </a:pPr>
             <a:r>
               <a:rPr lang="en-US" sz="2400" dirty="0"/>
@@ -17803,8 +17812,8 @@
           </a:p>
           <a:p>
             <a:pPr marL="342900" indent="-342900">
-              <a:buFontTx/>
-              <a:buChar char="-"/>
+              <a:buFont typeface="Arial" panose="020B0604020202020204" pitchFamily="34" charset="0"/>
+              <a:buChar char="•"/>
             </a:pPr>
             <a:r>
               <a:rPr lang="en-US" sz="2400" b="1" dirty="0">
@@ -17853,17 +17862,30 @@
             <a:off x="628053" y="8567625"/>
             <a:ext cx="9048750" cy="536406"/>
           </a:xfrm>
+          <a:solidFill>
+            <a:schemeClr val="accent1">
+              <a:lumMod val="75000"/>
+            </a:schemeClr>
+          </a:solidFill>
         </p:spPr>
         <p:txBody>
           <a:bodyPr/>
           <a:lstStyle/>
           <a:p>
             <a:r>
-              <a:rPr lang="en-US" sz="2800" dirty="0" err="1"/>
+              <a:rPr lang="en-US" sz="2800" u="none" dirty="0" err="1">
+                <a:solidFill>
+                  <a:schemeClr val="bg1"/>
+                </a:solidFill>
+              </a:rPr>
               <a:t>Friedkin</a:t>
             </a:r>
             <a:r>
-              <a:rPr lang="en-US" sz="2800" dirty="0"/>
+              <a:rPr lang="en-US" sz="2800" u="none" dirty="0">
+                <a:solidFill>
+                  <a:schemeClr val="bg1"/>
+                </a:solidFill>
+              </a:rPr>
               <a:t>-Johnsen opinion dynamics model</a:t>
             </a:r>
           </a:p>
@@ -17887,55 +17909,50 @@
         </p:nvSpPr>
         <p:spPr>
           <a:xfrm>
-            <a:off x="10108143" y="7607647"/>
-            <a:ext cx="9047690" cy="3070717"/>
+            <a:off x="10108143" y="7105635"/>
+            <a:ext cx="9047690" cy="1519524"/>
           </a:xfrm>
         </p:spPr>
         <p:txBody>
           <a:bodyPr/>
           <a:lstStyle/>
           <a:p>
+            <a:pPr marL="342900" indent="-342900">
+              <a:buFont typeface="Arial" panose="020B0604020202020204" pitchFamily="34" charset="0"/>
+              <a:buChar char="•"/>
+            </a:pPr>
             <a:r>
               <a:rPr lang="en-US" sz="2400" dirty="0"/>
-              <a:t>Datasets:</a:t>
+              <a:t>Twitter: 548 nodes (users), 3638 edges (user interactions)</a:t>
             </a:r>
           </a:p>
           <a:p>
             <a:pPr marL="342900" indent="-342900">
-              <a:buFontTx/>
-              <a:buChar char="-"/>
+              <a:buFont typeface="Arial" panose="020B0604020202020204" pitchFamily="34" charset="0"/>
+              <a:buChar char="•"/>
             </a:pPr>
             <a:r>
               <a:rPr lang="en-US" sz="2400" dirty="0"/>
-              <a:t>Twitter: 548 nodes, 3638 edges, which correspond to user interactions</a:t>
+              <a:t>Polarization and disagreement in function of  </a:t>
+            </a:r>
+            <a:r>
+              <a:rPr lang="el-GR" sz="2400" dirty="0"/>
+              <a:t>ε</a:t>
+            </a:r>
+            <a:r>
+              <a:rPr lang="en-US" sz="2400" dirty="0"/>
+              <a:t> (network changes)</a:t>
             </a:r>
           </a:p>
           <a:p>
             <a:pPr marL="342900" indent="-342900">
-              <a:buFontTx/>
-              <a:buChar char="-"/>
+              <a:buFont typeface="Arial" panose="020B0604020202020204" pitchFamily="34" charset="0"/>
+              <a:buChar char="•"/>
             </a:pPr>
             <a:r>
-              <a:rPr lang="en-US" sz="2400" dirty="0"/>
-              <a:t>Reddit: 556 nodes, 8969 edges, there is an edge between two users if there exist two subreddits</a:t>
+              <a:rPr lang="en-US" sz="2400" b="1" dirty="0"/>
+              <a:t>Minimization of disagreement leads to increased polarization!</a:t>
             </a:r>
-          </a:p>
-          <a:p>
-            <a:pPr marL="342900" indent="-342900">
-              <a:buFontTx/>
-              <a:buChar char="-"/>
-            </a:pPr>
-            <a:r>
-              <a:rPr lang="en-US" sz="2400" dirty="0"/>
-              <a:t>Both networks: Each user has multiple opinions associated to them </a:t>
-            </a:r>
-            <a:r>
-              <a:rPr lang="en-US" sz="2400" dirty="0">
-                <a:sym typeface="Wingdings" panose="05000000000000000000" pitchFamily="2" charset="2"/>
-              </a:rPr>
-              <a:t> Average to obtain an equilibrium expressed opinion for each user</a:t>
-            </a:r>
-            <a:endParaRPr lang="en-US" sz="2400" dirty="0"/>
           </a:p>
         </p:txBody>
       </p:sp>
@@ -17957,17 +17974,26 @@
         </p:nvSpPr>
         <p:spPr>
           <a:xfrm>
-            <a:off x="10102850" y="7055894"/>
+            <a:off x="10120779" y="6571811"/>
             <a:ext cx="9047690" cy="536406"/>
           </a:xfrm>
+          <a:solidFill>
+            <a:schemeClr val="bg1">
+              <a:lumMod val="50000"/>
+            </a:schemeClr>
+          </a:solidFill>
         </p:spPr>
         <p:txBody>
           <a:bodyPr/>
           <a:lstStyle/>
           <a:p>
             <a:r>
-              <a:rPr lang="en-US" sz="2800" dirty="0"/>
-              <a:t>Real life datasets (Twitter/Reddit) - Experiments</a:t>
+              <a:rPr lang="en-US" sz="2800" u="none" dirty="0">
+                <a:solidFill>
+                  <a:schemeClr val="bg1"/>
+                </a:solidFill>
+              </a:rPr>
+              <a:t>Experiment 1: Twitter dataset</a:t>
             </a:r>
           </a:p>
         </p:txBody>
@@ -17991,7 +18017,7 @@
         <p:spPr>
           <a:xfrm>
             <a:off x="10108143" y="3087451"/>
-            <a:ext cx="9047690" cy="3735515"/>
+            <a:ext cx="9047690" cy="2405920"/>
           </a:xfrm>
         </p:spPr>
         <p:txBody>
@@ -17999,39 +18025,19 @@
           <a:lstStyle/>
           <a:p>
             <a:r>
-              <a:rPr lang="en-US" sz="2400" b="1" u="sng" dirty="0"/>
-              <a:t>Polarization:</a:t>
+              <a:rPr lang="en-US" sz="2400" b="1"/>
+              <a:t>	</a:t>
             </a:r>
-            <a:endParaRPr lang="en-US" sz="2400" dirty="0"/>
+            <a:endParaRPr lang="en-US" sz="2400"/>
           </a:p>
           <a:p>
-            <a:endParaRPr lang="en-US" sz="2400" b="1" u="sng" dirty="0"/>
+            <a:endParaRPr lang="en-US" sz="2400" b="1" u="sng"/>
           </a:p>
           <a:p>
-            <a:r>
-              <a:rPr lang="en-US" sz="2400" b="1" u="sng" dirty="0"/>
-              <a:t>Disagreement:</a:t>
-            </a:r>
-            <a:endParaRPr lang="en-US" sz="2400" dirty="0"/>
+            <a:endParaRPr lang="en-US" sz="2400" b="1" u="sng"/>
           </a:p>
           <a:p>
-            <a:endParaRPr lang="en-US" sz="2400" b="1" u="sng" dirty="0"/>
-          </a:p>
-          <a:p>
-            <a:r>
-              <a:rPr lang="en-US" sz="2400" b="1" u="sng" dirty="0"/>
-              <a:t>Internal Conflict:</a:t>
-            </a:r>
-          </a:p>
-          <a:p>
-            <a:endParaRPr lang="en-US" sz="2400" b="1" u="sng" dirty="0"/>
-          </a:p>
-          <a:p>
-            <a:r>
-              <a:rPr lang="en-US" sz="2400" b="1" u="sng" dirty="0"/>
-              <a:t>Network Administrator Dynamics:</a:t>
-            </a:r>
-            <a:endParaRPr lang="en-US" sz="2400" dirty="0"/>
+            <a:endParaRPr lang="en-US" sz="2400" b="1" u="sng"/>
           </a:p>
           <a:p>
             <a:endParaRPr lang="en-US" sz="2400" b="1" u="sng" dirty="0"/>
@@ -18056,18 +18062,32 @@
         </p:nvSpPr>
         <p:spPr>
           <a:xfrm>
-            <a:off x="10102850" y="2579008"/>
+            <a:off x="10138708" y="2596940"/>
             <a:ext cx="9052983" cy="536406"/>
           </a:xfrm>
+          <a:solidFill>
+            <a:schemeClr val="accent1">
+              <a:lumMod val="75000"/>
+            </a:schemeClr>
+          </a:solidFill>
         </p:spPr>
         <p:txBody>
           <a:bodyPr/>
           <a:lstStyle/>
           <a:p>
             <a:r>
-              <a:rPr lang="en-US" sz="2800" dirty="0"/>
-              <a:t>Terminology</a:t>
+              <a:rPr lang="en-US" sz="2800" u="none">
+                <a:solidFill>
+                  <a:schemeClr val="bg1"/>
+                </a:solidFill>
+              </a:rPr>
+              <a:t>Concepts</a:t>
             </a:r>
+            <a:endParaRPr lang="en-US" sz="2800" u="none" dirty="0">
+              <a:solidFill>
+                <a:schemeClr val="bg1"/>
+              </a:solidFill>
+            </a:endParaRPr>
           </a:p>
         </p:txBody>
       </p:sp>
@@ -18092,40 +18112,29 @@
             <a:off x="19597159" y="2579008"/>
             <a:ext cx="9050686" cy="536406"/>
           </a:xfrm>
+          <a:solidFill>
+            <a:schemeClr val="accent1">
+              <a:lumMod val="75000"/>
+            </a:schemeClr>
+          </a:solidFill>
         </p:spPr>
         <p:txBody>
           <a:bodyPr/>
           <a:lstStyle/>
           <a:p>
             <a:r>
-              <a:rPr lang="en-US" sz="2800" dirty="0"/>
+              <a:rPr lang="en-US" sz="2800" u="none" strike="sngStrike">
+                <a:solidFill>
+                  <a:schemeClr val="bg1"/>
+                </a:solidFill>
+              </a:rPr>
               <a:t>Fragile Consensus</a:t>
             </a:r>
-          </a:p>
-        </p:txBody>
-      </p:sp>
-      <p:sp>
-        <p:nvSpPr>
-          <p:cNvPr id="36" name="Text Placeholder 35">
-            <a:extLst>
-              <a:ext uri="{FF2B5EF4-FFF2-40B4-BE49-F238E27FC236}">
-                <a16:creationId xmlns:a16="http://schemas.microsoft.com/office/drawing/2014/main" id="{3408BFE3-37F5-42A0-815E-F85A233E8F7B}"/>
-              </a:ext>
-            </a:extLst>
-          </p:cNvPr>
-          <p:cNvSpPr>
-            <a:spLocks noGrp="1"/>
-          </p:cNvSpPr>
-          <p:nvPr>
-            <p:ph type="body" sz="quarter" idx="26"/>
-          </p:nvPr>
-        </p:nvSpPr>
-        <p:spPr/>
-        <p:txBody>
-          <a:bodyPr/>
-          <a:lstStyle/>
-          <a:p>
-            <a:endParaRPr lang="en-US" dirty="0"/>
+            <a:endParaRPr lang="en-US" sz="2800" u="none" strike="sngStrike" dirty="0">
+              <a:solidFill>
+                <a:schemeClr val="bg1"/>
+              </a:solidFill>
+            </a:endParaRPr>
           </a:p>
         </p:txBody>
       </p:sp>
@@ -18150,15 +18159,29 @@
             <a:off x="19575072" y="5901442"/>
             <a:ext cx="9050686" cy="536406"/>
           </a:xfrm>
+          <a:solidFill>
+            <a:schemeClr val="accent1">
+              <a:lumMod val="75000"/>
+            </a:schemeClr>
+          </a:solidFill>
         </p:spPr>
         <p:txBody>
           <a:bodyPr/>
           <a:lstStyle/>
           <a:p>
             <a:r>
-              <a:rPr lang="en-US" sz="2800" dirty="0"/>
-              <a:t>Regularized Dynamics</a:t>
+              <a:rPr lang="en-US" sz="2800" u="none">
+                <a:solidFill>
+                  <a:schemeClr val="bg1"/>
+                </a:solidFill>
+              </a:rPr>
+              <a:t>Regularized Dynamics reduces polarization</a:t>
             </a:r>
+            <a:endParaRPr lang="en-US" sz="2800" u="none" dirty="0">
+              <a:solidFill>
+                <a:schemeClr val="bg1"/>
+              </a:solidFill>
+            </a:endParaRPr>
           </a:p>
         </p:txBody>
       </p:sp>
@@ -18181,50 +18204,36 @@
         <p:spPr>
           <a:xfrm>
             <a:off x="19571717" y="6453531"/>
-            <a:ext cx="9054041" cy="3292317"/>
+            <a:ext cx="9054041" cy="1888855"/>
           </a:xfrm>
         </p:spPr>
         <p:txBody>
           <a:bodyPr/>
           <a:lstStyle/>
           <a:p>
-            <a:r>
-              <a:rPr lang="en-US" sz="2400" b="1" u="sng" dirty="0"/>
-              <a:t>Regularized Network Administrator Dynamics:</a:t>
-            </a:r>
-          </a:p>
-          <a:p>
+            <a:pPr marL="342900" indent="-342900">
+              <a:buFont typeface="Arial" panose="020B0604020202020204" pitchFamily="34" charset="0"/>
+              <a:buChar char="•"/>
+            </a:pPr>
             <a:r>
               <a:rPr lang="en-US" sz="2400" dirty="0"/>
-              <a:t>- Fragile Consensus</a:t>
-            </a:r>
-          </a:p>
-          <a:p>
-            <a:endParaRPr lang="en-US" sz="2400" b="1" u="sng" dirty="0"/>
-          </a:p>
-          <a:p>
-            <a:endParaRPr lang="en-US" sz="2400" b="1" u="sng" dirty="0"/>
-          </a:p>
-          <a:p>
-            <a:r>
-              <a:rPr lang="en-US" sz="2400" dirty="0"/>
-              <a:t>Remedy:</a:t>
+              <a:t>Adding regularization term to network administrator objective function</a:t>
             </a:r>
           </a:p>
           <a:p>
             <a:pPr marL="342900" indent="-342900">
-              <a:buFontTx/>
-              <a:buChar char="-"/>
+              <a:buFont typeface="Arial" panose="020B0604020202020204" pitchFamily="34" charset="0"/>
+              <a:buChar char="•"/>
             </a:pPr>
             <a:r>
               <a:rPr lang="en-US" sz="2400" dirty="0"/>
-              <a:t>Slight modification</a:t>
+              <a:t>Polarization largely mitigated</a:t>
             </a:r>
           </a:p>
           <a:p>
             <a:pPr marL="342900" indent="-342900">
-              <a:buFontTx/>
-              <a:buChar char="-"/>
+              <a:buFont typeface="Arial" panose="020B0604020202020204" pitchFamily="34" charset="0"/>
+              <a:buChar char="•"/>
             </a:pPr>
             <a:r>
               <a:rPr lang="en-US" sz="2400" dirty="0"/>
@@ -18251,8 +18260,8 @@
         </p:nvSpPr>
         <p:spPr>
           <a:xfrm>
-            <a:off x="3906520" y="1243410"/>
-            <a:ext cx="24852526" cy="982869"/>
+            <a:off x="628053" y="1243410"/>
+            <a:ext cx="28130993" cy="816993"/>
           </a:xfrm>
         </p:spPr>
         <p:txBody>
@@ -18262,9 +18271,16 @@
           <a:lstStyle/>
           <a:p>
             <a:r>
-              <a:rPr lang="en-US" sz="4800" dirty="0"/>
-              <a:t>By Geert Goemaere and Darin Verheijke – University of Antwerp</a:t>
+              <a:rPr lang="en-US" sz="4800">
+                <a:latin typeface="Times New Roman" panose="02020603050405020304" pitchFamily="18" charset="0"/>
+                <a:cs typeface="Times New Roman" panose="02020603050405020304" pitchFamily="18" charset="0"/>
+              </a:rPr>
+              <a:t>By Geert Goemaere and Darin Verheijke</a:t>
             </a:r>
+            <a:endParaRPr lang="en-US" sz="4800" dirty="0">
+              <a:latin typeface="Times New Roman" panose="02020603050405020304" pitchFamily="18" charset="0"/>
+              <a:cs typeface="Times New Roman" panose="02020603050405020304" pitchFamily="18" charset="0"/>
+            </a:endParaRPr>
           </a:p>
         </p:txBody>
       </p:sp>
@@ -18286,23 +18302,27 @@
         </p:nvSpPr>
         <p:spPr>
           <a:xfrm>
-            <a:off x="3906520" y="361382"/>
-            <a:ext cx="24852526" cy="1093042"/>
+            <a:off x="628053" y="187931"/>
+            <a:ext cx="28130993" cy="1055479"/>
           </a:xfrm>
         </p:spPr>
         <p:txBody>
           <a:bodyPr>
-            <a:normAutofit lnSpcReduction="10000"/>
+            <a:normAutofit fontScale="92500" lnSpcReduction="10000"/>
           </a:bodyPr>
           <a:lstStyle/>
           <a:p>
             <a:r>
-              <a:rPr lang="en-US" sz="6600" dirty="0">
+              <a:rPr lang="en-US" sz="7200">
                 <a:latin typeface="Times New Roman" panose="02020603050405020304" pitchFamily="18" charset="0"/>
                 <a:cs typeface="Times New Roman" panose="02020603050405020304" pitchFamily="18" charset="0"/>
               </a:rPr>
-              <a:t>Understanding Filter Bubbles and Polarization in Social Networks</a:t>
+              <a:t>Understanding filter bubbles and polarization in social networks</a:t>
             </a:r>
+            <a:endParaRPr lang="en-US" sz="7200" dirty="0">
+              <a:latin typeface="Times New Roman" panose="02020603050405020304" pitchFamily="18" charset="0"/>
+              <a:cs typeface="Times New Roman" panose="02020603050405020304" pitchFamily="18" charset="0"/>
+            </a:endParaRPr>
           </a:p>
         </p:txBody>
       </p:sp>
@@ -18522,12 +18542,3046 @@
           </a:p>
         </p:txBody>
       </p:sp>
+      <p:grpSp>
+        <p:nvGrpSpPr>
+          <p:cNvPr id="8" name="Groep 7">
+            <a:extLst>
+              <a:ext uri="{FF2B5EF4-FFF2-40B4-BE49-F238E27FC236}">
+                <a16:creationId xmlns:a16="http://schemas.microsoft.com/office/drawing/2014/main" id="{015D1E49-8808-435F-BCAF-698657D788CF}"/>
+              </a:ext>
+            </a:extLst>
+          </p:cNvPr>
+          <p:cNvGrpSpPr/>
+          <p:nvPr/>
+        </p:nvGrpSpPr>
+        <p:grpSpPr>
+          <a:xfrm>
+            <a:off x="10148204" y="8546265"/>
+            <a:ext cx="8981577" cy="3048001"/>
+            <a:chOff x="10262504" y="9413694"/>
+            <a:chExt cx="8981577" cy="3048001"/>
+          </a:xfrm>
+          <a:solidFill>
+            <a:schemeClr val="bg1">
+              <a:lumMod val="95000"/>
+            </a:schemeClr>
+          </a:solidFill>
+        </p:grpSpPr>
+        <p:pic>
+          <p:nvPicPr>
+            <p:cNvPr id="3" name="Afbeelding 2">
+              <a:extLst>
+                <a:ext uri="{FF2B5EF4-FFF2-40B4-BE49-F238E27FC236}">
+                  <a16:creationId xmlns:a16="http://schemas.microsoft.com/office/drawing/2014/main" id="{B0B6A6B7-7CF9-4F72-989F-16BC46C9D4A0}"/>
+                </a:ext>
+              </a:extLst>
+            </p:cNvPr>
+            <p:cNvPicPr>
+              <a:picLocks noChangeAspect="1"/>
+            </p:cNvPicPr>
+            <p:nvPr/>
+          </p:nvPicPr>
+          <p:blipFill>
+            <a:blip r:embed="rId5">
+              <a:extLst>
+                <a:ext uri="{28A0092B-C50C-407E-A947-70E740481C1C}">
+                  <a14:useLocalDpi xmlns:a14="http://schemas.microsoft.com/office/drawing/2010/main" val="0"/>
+                </a:ext>
+              </a:extLst>
+            </a:blip>
+            <a:stretch>
+              <a:fillRect/>
+            </a:stretch>
+          </p:blipFill>
+          <p:spPr>
+            <a:xfrm>
+              <a:off x="10262504" y="9413694"/>
+              <a:ext cx="4572000" cy="3048001"/>
+            </a:xfrm>
+            <a:prstGeom prst="rect">
+              <a:avLst/>
+            </a:prstGeom>
+            <a:grpFill/>
+            <a:ln>
+              <a:noFill/>
+            </a:ln>
+          </p:spPr>
+        </p:pic>
+        <p:pic>
+          <p:nvPicPr>
+            <p:cNvPr id="7" name="Afbeelding 6">
+              <a:extLst>
+                <a:ext uri="{FF2B5EF4-FFF2-40B4-BE49-F238E27FC236}">
+                  <a16:creationId xmlns:a16="http://schemas.microsoft.com/office/drawing/2014/main" id="{EEA311DC-FDA4-4E0D-86CC-32ACC532EAD9}"/>
+                </a:ext>
+              </a:extLst>
+            </p:cNvPr>
+            <p:cNvPicPr>
+              <a:picLocks noChangeAspect="1"/>
+            </p:cNvPicPr>
+            <p:nvPr/>
+          </p:nvPicPr>
+          <p:blipFill>
+            <a:blip r:embed="rId6">
+              <a:extLst>
+                <a:ext uri="{28A0092B-C50C-407E-A947-70E740481C1C}">
+                  <a14:useLocalDpi xmlns:a14="http://schemas.microsoft.com/office/drawing/2010/main" val="0"/>
+                </a:ext>
+              </a:extLst>
+            </a:blip>
+            <a:stretch>
+              <a:fillRect/>
+            </a:stretch>
+          </p:blipFill>
+          <p:spPr>
+            <a:xfrm>
+              <a:off x="14672081" y="9413694"/>
+              <a:ext cx="4572000" cy="3048000"/>
+            </a:xfrm>
+            <a:prstGeom prst="rect">
+              <a:avLst/>
+            </a:prstGeom>
+            <a:grpFill/>
+            <a:ln>
+              <a:noFill/>
+            </a:ln>
+          </p:spPr>
+        </p:pic>
+      </p:grpSp>
+      <mc:AlternateContent xmlns:mc="http://schemas.openxmlformats.org/markup-compatibility/2006" xmlns:a14="http://schemas.microsoft.com/office/drawing/2010/main">
+        <mc:Choice Requires="a14">
+          <p:graphicFrame>
+            <p:nvGraphicFramePr>
+              <p:cNvPr id="10" name="Tabel 10">
+                <a:extLst>
+                  <a:ext uri="{FF2B5EF4-FFF2-40B4-BE49-F238E27FC236}">
+                    <a16:creationId xmlns:a16="http://schemas.microsoft.com/office/drawing/2014/main" id="{8BBFC0D3-9DEC-4FAE-BC70-AD3B538B0F1D}"/>
+                  </a:ext>
+                </a:extLst>
+              </p:cNvPr>
+              <p:cNvGraphicFramePr>
+                <a:graphicFrameLocks noGrp="1"/>
+              </p:cNvGraphicFramePr>
+              <p:nvPr>
+                <p:extLst>
+                  <p:ext uri="{D42A27DB-BD31-4B8C-83A1-F6EECF244321}">
+                    <p14:modId xmlns:p14="http://schemas.microsoft.com/office/powerpoint/2010/main" val="17848649"/>
+                  </p:ext>
+                </p:extLst>
+              </p:nvPr>
+            </p:nvGraphicFramePr>
+            <p:xfrm>
+              <a:off x="10149824" y="3120119"/>
+              <a:ext cx="8981577" cy="3393287"/>
+            </p:xfrm>
+            <a:graphic>
+              <a:graphicData uri="http://schemas.openxmlformats.org/drawingml/2006/table">
+                <a:tbl>
+                  <a:tblPr firstRow="1" bandRow="1">
+                    <a:tableStyleId>{3B4B98B0-60AC-42C2-AFA5-B58CD77FA1E5}</a:tableStyleId>
+                  </a:tblPr>
+                  <a:tblGrid>
+                    <a:gridCol w="3108976">
+                      <a:extLst>
+                        <a:ext uri="{9D8B030D-6E8A-4147-A177-3AD203B41FA5}">
+                          <a16:colId xmlns:a16="http://schemas.microsoft.com/office/drawing/2014/main" val="525672547"/>
+                        </a:ext>
+                      </a:extLst>
+                    </a:gridCol>
+                    <a:gridCol w="5872601">
+                      <a:extLst>
+                        <a:ext uri="{9D8B030D-6E8A-4147-A177-3AD203B41FA5}">
+                          <a16:colId xmlns:a16="http://schemas.microsoft.com/office/drawing/2014/main" val="2807499271"/>
+                        </a:ext>
+                      </a:extLst>
+                    </a:gridCol>
+                  </a:tblGrid>
+                  <a:tr h="845625">
+                    <a:tc>
+                      <a:txBody>
+                        <a:bodyPr/>
+                        <a:lstStyle/>
+                        <a:p>
+                          <a:r>
+                            <a:rPr lang="en-US" sz="2400" b="0" kern="1200" dirty="0">
+                              <a:solidFill>
+                                <a:schemeClr val="accent5">
+                                  <a:lumMod val="50000"/>
+                                </a:schemeClr>
+                              </a:solidFill>
+                            </a:rPr>
+                            <a:t>Polarization</a:t>
+                          </a:r>
+                          <a:endParaRPr lang="nl-BE" sz="2400" b="0" kern="1200" dirty="0">
+                            <a:solidFill>
+                              <a:schemeClr val="accent5">
+                                <a:lumMod val="50000"/>
+                              </a:schemeClr>
+                            </a:solidFill>
+                            <a:latin typeface="Times New Roman" panose="02020603050405020304" pitchFamily="18" charset="0"/>
+                            <a:ea typeface="+mn-ea"/>
+                            <a:cs typeface="Times New Roman" panose="02020603050405020304" pitchFamily="18" charset="0"/>
+                          </a:endParaRPr>
+                        </a:p>
+                      </a:txBody>
+                      <a:tcPr marL="82940" marR="82940" marT="41470" marB="41470"/>
+                    </a:tc>
+                    <a:tc>
+                      <a:txBody>
+                        <a:bodyPr/>
+                        <a:lstStyle/>
+                        <a:p>
+                          <a:pPr algn="ctr"/>
+                          <a:r>
+                            <a:rPr lang="en-US" sz="2000" b="0" kern="1200" dirty="0">
+                              <a:solidFill>
+                                <a:schemeClr val="accent5">
+                                  <a:lumMod val="50000"/>
+                                </a:schemeClr>
+                              </a:solidFill>
+                            </a:rPr>
+                            <a:t>Variance of given set of opinions (</a:t>
+                          </a:r>
+                          <a14:m>
+                            <m:oMath xmlns:m="http://schemas.openxmlformats.org/officeDocument/2006/math">
+                              <m:sSub>
+                                <m:sSubPr>
+                                  <m:ctrlPr>
+                                    <a:rPr lang="pt-BR" sz="2000" b="0" i="1" kern="1200" smtClean="0">
+                                      <a:solidFill>
+                                        <a:schemeClr val="accent5">
+                                          <a:lumMod val="50000"/>
+                                        </a:schemeClr>
+                                      </a:solidFill>
+                                      <a:latin typeface="Cambria Math" panose="02040503050406030204" pitchFamily="18" charset="0"/>
+                                    </a:rPr>
+                                  </m:ctrlPr>
+                                </m:sSubPr>
+                                <m:e>
+                                  <m:r>
+                                    <a:rPr lang="en-US" sz="2000" b="0" kern="1200" smtClean="0">
+                                      <a:solidFill>
+                                        <a:schemeClr val="accent5">
+                                          <a:lumMod val="50000"/>
+                                        </a:schemeClr>
+                                      </a:solidFill>
+                                      <a:latin typeface="Cambria Math" panose="02040503050406030204" pitchFamily="18" charset="0"/>
+                                    </a:rPr>
+                                    <m:t>𝑧</m:t>
+                                  </m:r>
+                                </m:e>
+                                <m:sub>
+                                  <m:r>
+                                    <a:rPr lang="en-US" sz="2000" b="0" kern="1200" smtClean="0">
+                                      <a:solidFill>
+                                        <a:schemeClr val="accent5">
+                                          <a:lumMod val="50000"/>
+                                        </a:schemeClr>
+                                      </a:solidFill>
+                                      <a:latin typeface="Cambria Math" panose="02040503050406030204" pitchFamily="18" charset="0"/>
+                                    </a:rPr>
+                                    <m:t>𝑖</m:t>
+                                  </m:r>
+                                </m:sub>
+                              </m:sSub>
+                            </m:oMath>
+                          </a14:m>
+                          <a:r>
+                            <a:rPr lang="en-US" sz="2000" b="0" kern="1200" dirty="0">
+                              <a:solidFill>
+                                <a:schemeClr val="accent5">
+                                  <a:lumMod val="50000"/>
+                                </a:schemeClr>
+                              </a:solidFill>
+                            </a:rPr>
+                            <a:t>)</a:t>
+                          </a:r>
+                        </a:p>
+                        <a:p>
+                          <a:pPr algn="ctr"/>
+                          <a:r>
+                            <a:rPr lang="pt-BR" sz="2400" b="0" kern="1200" dirty="0">
+                              <a:solidFill>
+                                <a:schemeClr val="accent5">
+                                  <a:lumMod val="50000"/>
+                                </a:schemeClr>
+                              </a:solidFill>
+                            </a:rPr>
+                            <a:t> </a:t>
+                          </a:r>
+                          <a14:m>
+                            <m:oMath xmlns:m="http://schemas.openxmlformats.org/officeDocument/2006/math">
+                              <m:sSub>
+                                <m:sSubPr>
+                                  <m:ctrlPr>
+                                    <a:rPr lang="pt-BR" sz="2400" b="0" i="1" kern="1200" smtClean="0">
+                                      <a:solidFill>
+                                        <a:schemeClr val="accent5">
+                                          <a:lumMod val="50000"/>
+                                        </a:schemeClr>
+                                      </a:solidFill>
+                                      <a:latin typeface="Cambria Math" panose="02040503050406030204" pitchFamily="18" charset="0"/>
+                                    </a:rPr>
+                                  </m:ctrlPr>
+                                </m:sSubPr>
+                                <m:e>
+                                  <m:r>
+                                    <a:rPr lang="pt-BR" sz="2400" b="0" kern="1200" smtClean="0">
+                                      <a:solidFill>
+                                        <a:schemeClr val="accent5">
+                                          <a:lumMod val="50000"/>
+                                        </a:schemeClr>
+                                      </a:solidFill>
+                                      <a:latin typeface="Cambria Math" panose="02040503050406030204" pitchFamily="18" charset="0"/>
+                                    </a:rPr>
+                                    <m:t>𝒫</m:t>
+                                  </m:r>
+                                </m:e>
+                                <m:sub>
+                                  <m:r>
+                                    <a:rPr lang="en-US" sz="2400" b="0" kern="1200" smtClean="0">
+                                      <a:solidFill>
+                                        <a:schemeClr val="accent5">
+                                          <a:lumMod val="50000"/>
+                                        </a:schemeClr>
+                                      </a:solidFill>
+                                      <a:latin typeface="Cambria Math" panose="02040503050406030204" pitchFamily="18" charset="0"/>
+                                    </a:rPr>
+                                    <m:t>𝑧</m:t>
+                                  </m:r>
+                                </m:sub>
+                              </m:sSub>
+                              <m:r>
+                                <a:rPr lang="pt-BR" sz="2400" b="0" kern="1200" smtClean="0">
+                                  <a:solidFill>
+                                    <a:schemeClr val="accent5">
+                                      <a:lumMod val="50000"/>
+                                    </a:schemeClr>
+                                  </a:solidFill>
+                                  <a:latin typeface="Cambria Math" panose="02040503050406030204" pitchFamily="18" charset="0"/>
+                                </a:rPr>
+                                <m:t>≝</m:t>
+                              </m:r>
+                              <m:nary>
+                                <m:naryPr>
+                                  <m:chr m:val="∑"/>
+                                  <m:ctrlPr>
+                                    <a:rPr lang="pt-BR" sz="2400" b="0" i="1" kern="1200" smtClean="0">
+                                      <a:solidFill>
+                                        <a:schemeClr val="accent5">
+                                          <a:lumMod val="50000"/>
+                                        </a:schemeClr>
+                                      </a:solidFill>
+                                      <a:latin typeface="Cambria Math" panose="02040503050406030204" pitchFamily="18" charset="0"/>
+                                    </a:rPr>
+                                  </m:ctrlPr>
+                                </m:naryPr>
+                                <m:sub>
+                                  <m:r>
+                                    <m:rPr>
+                                      <m:brk m:alnAt="23"/>
+                                    </m:rPr>
+                                    <a:rPr lang="en-US" sz="2400" b="0" kern="1200" smtClean="0">
+                                      <a:solidFill>
+                                        <a:schemeClr val="accent5">
+                                          <a:lumMod val="50000"/>
+                                        </a:schemeClr>
+                                      </a:solidFill>
+                                      <a:latin typeface="Cambria Math" panose="02040503050406030204" pitchFamily="18" charset="0"/>
+                                    </a:rPr>
+                                    <m:t>𝑖</m:t>
+                                  </m:r>
+                                  <m:r>
+                                    <a:rPr lang="pt-BR" sz="2400" b="0" kern="1200" smtClean="0">
+                                      <a:solidFill>
+                                        <a:schemeClr val="accent5">
+                                          <a:lumMod val="50000"/>
+                                        </a:schemeClr>
+                                      </a:solidFill>
+                                      <a:latin typeface="Cambria Math" panose="02040503050406030204" pitchFamily="18" charset="0"/>
+                                    </a:rPr>
+                                    <m:t>=</m:t>
+                                  </m:r>
+                                  <m:r>
+                                    <a:rPr lang="en-US" sz="2400" b="0" kern="1200" smtClean="0">
+                                      <a:solidFill>
+                                        <a:schemeClr val="accent5">
+                                          <a:lumMod val="50000"/>
+                                        </a:schemeClr>
+                                      </a:solidFill>
+                                      <a:latin typeface="Cambria Math" panose="02040503050406030204" pitchFamily="18" charset="0"/>
+                                    </a:rPr>
+                                    <m:t>1</m:t>
+                                  </m:r>
+                                </m:sub>
+                                <m:sup>
+                                  <m:r>
+                                    <a:rPr lang="pt-BR" sz="2400" b="0" kern="1200" smtClean="0">
+                                      <a:solidFill>
+                                        <a:schemeClr val="accent5">
+                                          <a:lumMod val="50000"/>
+                                        </a:schemeClr>
+                                      </a:solidFill>
+                                      <a:latin typeface="Cambria Math" panose="02040503050406030204" pitchFamily="18" charset="0"/>
+                                    </a:rPr>
+                                    <m:t>𝑛</m:t>
+                                  </m:r>
+                                </m:sup>
+                                <m:e>
+                                  <m:sSup>
+                                    <m:sSupPr>
+                                      <m:ctrlPr>
+                                        <a:rPr lang="pt-BR" sz="2400" b="0" i="1" kern="1200" smtClean="0">
+                                          <a:solidFill>
+                                            <a:schemeClr val="accent5">
+                                              <a:lumMod val="50000"/>
+                                            </a:schemeClr>
+                                          </a:solidFill>
+                                          <a:latin typeface="Cambria Math" panose="02040503050406030204" pitchFamily="18" charset="0"/>
+                                        </a:rPr>
+                                      </m:ctrlPr>
+                                    </m:sSupPr>
+                                    <m:e>
+                                      <m:d>
+                                        <m:dPr>
+                                          <m:ctrlPr>
+                                            <a:rPr lang="pt-BR" sz="2400" b="0" i="1" kern="1200" smtClean="0">
+                                              <a:solidFill>
+                                                <a:schemeClr val="accent5">
+                                                  <a:lumMod val="50000"/>
+                                                </a:schemeClr>
+                                              </a:solidFill>
+                                              <a:latin typeface="Cambria Math" panose="02040503050406030204" pitchFamily="18" charset="0"/>
+                                            </a:rPr>
+                                          </m:ctrlPr>
+                                        </m:dPr>
+                                        <m:e>
+                                          <m:sSub>
+                                            <m:sSubPr>
+                                              <m:ctrlPr>
+                                                <a:rPr lang="pt-BR" sz="2400" b="0" i="1" kern="1200" smtClean="0">
+                                                  <a:solidFill>
+                                                    <a:schemeClr val="accent5">
+                                                      <a:lumMod val="50000"/>
+                                                    </a:schemeClr>
+                                                  </a:solidFill>
+                                                  <a:latin typeface="Cambria Math" panose="02040503050406030204" pitchFamily="18" charset="0"/>
+                                                </a:rPr>
+                                              </m:ctrlPr>
+                                            </m:sSubPr>
+                                            <m:e>
+                                              <m:r>
+                                                <a:rPr lang="en-US" sz="2400" b="0" kern="1200" smtClean="0">
+                                                  <a:solidFill>
+                                                    <a:schemeClr val="accent5">
+                                                      <a:lumMod val="50000"/>
+                                                    </a:schemeClr>
+                                                  </a:solidFill>
+                                                  <a:latin typeface="Cambria Math" panose="02040503050406030204" pitchFamily="18" charset="0"/>
+                                                </a:rPr>
+                                                <m:t>𝑧</m:t>
+                                              </m:r>
+                                            </m:e>
+                                            <m:sub>
+                                              <m:r>
+                                                <a:rPr lang="en-US" sz="2400" b="0" kern="1200" smtClean="0">
+                                                  <a:solidFill>
+                                                    <a:schemeClr val="accent5">
+                                                      <a:lumMod val="50000"/>
+                                                    </a:schemeClr>
+                                                  </a:solidFill>
+                                                  <a:latin typeface="Cambria Math" panose="02040503050406030204" pitchFamily="18" charset="0"/>
+                                                </a:rPr>
+                                                <m:t>𝑖</m:t>
+                                              </m:r>
+                                            </m:sub>
+                                          </m:sSub>
+                                          <m:r>
+                                            <a:rPr lang="en-US" sz="2400" b="0" kern="1200" smtClean="0">
+                                              <a:solidFill>
+                                                <a:schemeClr val="accent5">
+                                                  <a:lumMod val="50000"/>
+                                                </a:schemeClr>
+                                              </a:solidFill>
+                                              <a:latin typeface="Cambria Math" panose="02040503050406030204" pitchFamily="18" charset="0"/>
+                                            </a:rPr>
+                                            <m:t> −</m:t>
+                                          </m:r>
+                                          <m:r>
+                                            <a:rPr lang="en-US" sz="2400" b="0" kern="1200" smtClean="0">
+                                              <a:solidFill>
+                                                <a:schemeClr val="accent5">
+                                                  <a:lumMod val="50000"/>
+                                                </a:schemeClr>
+                                              </a:solidFill>
+                                              <a:latin typeface="Cambria Math" panose="02040503050406030204" pitchFamily="18" charset="0"/>
+                                            </a:rPr>
+                                            <m:t>𝑚𝑒𝑎𝑛</m:t>
+                                          </m:r>
+                                          <m:d>
+                                            <m:dPr>
+                                              <m:ctrlPr>
+                                                <a:rPr lang="en-US" sz="2400" b="0" i="1" kern="1200" smtClean="0">
+                                                  <a:solidFill>
+                                                    <a:schemeClr val="accent5">
+                                                      <a:lumMod val="50000"/>
+                                                    </a:schemeClr>
+                                                  </a:solidFill>
+                                                  <a:latin typeface="Cambria Math" panose="02040503050406030204" pitchFamily="18" charset="0"/>
+                                                </a:rPr>
+                                              </m:ctrlPr>
+                                            </m:dPr>
+                                            <m:e>
+                                              <m:r>
+                                                <a:rPr lang="en-US" sz="2400" b="0" kern="1200" smtClean="0">
+                                                  <a:solidFill>
+                                                    <a:schemeClr val="accent5">
+                                                      <a:lumMod val="50000"/>
+                                                    </a:schemeClr>
+                                                  </a:solidFill>
+                                                  <a:latin typeface="Cambria Math" panose="02040503050406030204" pitchFamily="18" charset="0"/>
+                                                </a:rPr>
+                                                <m:t>𝑧</m:t>
+                                              </m:r>
+                                            </m:e>
+                                          </m:d>
+                                        </m:e>
+                                      </m:d>
+                                    </m:e>
+                                    <m:sup>
+                                      <m:r>
+                                        <a:rPr lang="en-US" sz="2400" b="0" kern="1200" smtClean="0">
+                                          <a:solidFill>
+                                            <a:schemeClr val="accent5">
+                                              <a:lumMod val="50000"/>
+                                            </a:schemeClr>
+                                          </a:solidFill>
+                                          <a:latin typeface="Cambria Math" panose="02040503050406030204" pitchFamily="18" charset="0"/>
+                                        </a:rPr>
+                                        <m:t>2</m:t>
+                                      </m:r>
+                                    </m:sup>
+                                  </m:sSup>
+                                </m:e>
+                              </m:nary>
+                            </m:oMath>
+                          </a14:m>
+                          <a:endParaRPr lang="nl-BE" sz="2400" b="0" kern="1200" dirty="0">
+                            <a:solidFill>
+                              <a:schemeClr val="accent5">
+                                <a:lumMod val="50000"/>
+                              </a:schemeClr>
+                            </a:solidFill>
+                            <a:latin typeface="Times New Roman" panose="02020603050405020304" pitchFamily="18" charset="0"/>
+                            <a:ea typeface="+mn-ea"/>
+                            <a:cs typeface="Times New Roman" panose="02020603050405020304" pitchFamily="18" charset="0"/>
+                          </a:endParaRPr>
+                        </a:p>
+                      </a:txBody>
+                      <a:tcPr marL="82940" marR="82940" marT="41470" marB="41470"/>
+                    </a:tc>
+                    <a:extLst>
+                      <a:ext uri="{0D108BD9-81ED-4DB2-BD59-A6C34878D82A}">
+                        <a16:rowId xmlns:a16="http://schemas.microsoft.com/office/drawing/2014/main" val="2131681267"/>
+                      </a:ext>
+                    </a:extLst>
+                  </a:tr>
+                  <a:tr h="899557">
+                    <a:tc>
+                      <a:txBody>
+                        <a:bodyPr/>
+                        <a:lstStyle/>
+                        <a:p>
+                          <a:r>
+                            <a:rPr lang="en-US" sz="2400" b="0" kern="1200" dirty="0">
+                              <a:solidFill>
+                                <a:schemeClr val="accent5">
+                                  <a:lumMod val="50000"/>
+                                </a:schemeClr>
+                              </a:solidFill>
+                            </a:rPr>
+                            <a:t>Disagreement</a:t>
+                          </a:r>
+                          <a:endParaRPr lang="nl-BE" sz="2400" b="0" kern="1200" dirty="0">
+                            <a:solidFill>
+                              <a:schemeClr val="accent5">
+                                <a:lumMod val="50000"/>
+                              </a:schemeClr>
+                            </a:solidFill>
+                            <a:latin typeface="Times New Roman" panose="02020603050405020304" pitchFamily="18" charset="0"/>
+                            <a:ea typeface="+mn-ea"/>
+                            <a:cs typeface="Times New Roman" panose="02020603050405020304" pitchFamily="18" charset="0"/>
+                          </a:endParaRPr>
+                        </a:p>
+                      </a:txBody>
+                      <a:tcPr marL="82940" marR="82940" marT="41470" marB="41470"/>
+                    </a:tc>
+                    <a:tc>
+                      <a:txBody>
+                        <a:bodyPr/>
+                        <a:lstStyle/>
+                        <a:p>
+                          <a:pPr algn="ctr"/>
+                          <a:r>
+                            <a:rPr lang="en-US" sz="2000" b="0" kern="1200" dirty="0">
+                              <a:solidFill>
+                                <a:schemeClr val="accent5">
+                                  <a:lumMod val="50000"/>
+                                </a:schemeClr>
+                              </a:solidFill>
+                            </a:rPr>
+                            <a:t>Misalignment between opinions (</a:t>
+                          </a:r>
+                          <a14:m>
+                            <m:oMath xmlns:m="http://schemas.openxmlformats.org/officeDocument/2006/math">
+                              <m:sSub>
+                                <m:sSubPr>
+                                  <m:ctrlPr>
+                                    <a:rPr lang="pt-BR" sz="2000" b="0" i="1" kern="1200" smtClean="0">
+                                      <a:solidFill>
+                                        <a:schemeClr val="accent5">
+                                          <a:lumMod val="50000"/>
+                                        </a:schemeClr>
+                                      </a:solidFill>
+                                      <a:latin typeface="Cambria Math" panose="02040503050406030204" pitchFamily="18" charset="0"/>
+                                    </a:rPr>
+                                  </m:ctrlPr>
+                                </m:sSubPr>
+                                <m:e>
+                                  <m:r>
+                                    <a:rPr lang="en-US" sz="2000" b="0" kern="1200" smtClean="0">
+                                      <a:solidFill>
+                                        <a:schemeClr val="accent5">
+                                          <a:lumMod val="50000"/>
+                                        </a:schemeClr>
+                                      </a:solidFill>
+                                      <a:latin typeface="Cambria Math" panose="02040503050406030204" pitchFamily="18" charset="0"/>
+                                    </a:rPr>
+                                    <m:t>𝑧</m:t>
+                                  </m:r>
+                                </m:e>
+                                <m:sub>
+                                  <m:r>
+                                    <a:rPr lang="en-US" sz="2000" b="0" kern="1200" smtClean="0">
+                                      <a:solidFill>
+                                        <a:schemeClr val="accent5">
+                                          <a:lumMod val="50000"/>
+                                        </a:schemeClr>
+                                      </a:solidFill>
+                                      <a:latin typeface="Cambria Math" panose="02040503050406030204" pitchFamily="18" charset="0"/>
+                                    </a:rPr>
+                                    <m:t>𝑖</m:t>
+                                  </m:r>
+                                </m:sub>
+                              </m:sSub>
+                            </m:oMath>
+                          </a14:m>
+                          <a:r>
+                            <a:rPr lang="en-US" sz="2000" b="0" kern="1200" dirty="0">
+                              <a:solidFill>
+                                <a:schemeClr val="accent5">
+                                  <a:lumMod val="50000"/>
+                                </a:schemeClr>
+                              </a:solidFill>
+                            </a:rPr>
+                            <a:t>)</a:t>
+                          </a:r>
+                        </a:p>
+                        <a:p>
+                          <a:pPr marL="0" marR="0" lvl="0" indent="0" algn="ctr" defTabSz="2675223" rtl="0" eaLnBrk="1" fontAlgn="auto" latinLnBrk="0" hangingPunct="1">
+                            <a:lnSpc>
+                              <a:spcPct val="100000"/>
+                            </a:lnSpc>
+                            <a:spcBef>
+                              <a:spcPts val="0"/>
+                            </a:spcBef>
+                            <a:spcAft>
+                              <a:spcPts val="0"/>
+                            </a:spcAft>
+                            <a:buClrTx/>
+                            <a:buSzTx/>
+                            <a:buFontTx/>
+                            <a:buNone/>
+                            <a:tabLst/>
+                            <a:defRPr/>
+                          </a:pPr>
+                          <a:r>
+                            <a:rPr lang="pt-BR" sz="2400" b="0" kern="1200" dirty="0">
+                              <a:solidFill>
+                                <a:schemeClr val="accent5">
+                                  <a:lumMod val="50000"/>
+                                </a:schemeClr>
+                              </a:solidFill>
+                            </a:rPr>
+                            <a:t> </a:t>
+                          </a:r>
+                          <a14:m>
+                            <m:oMath xmlns:m="http://schemas.openxmlformats.org/officeDocument/2006/math">
+                              <m:sSub>
+                                <m:sSubPr>
+                                  <m:ctrlPr>
+                                    <a:rPr lang="pt-BR" sz="2400" b="0" i="1" kern="1200" smtClean="0">
+                                      <a:solidFill>
+                                        <a:schemeClr val="accent5">
+                                          <a:lumMod val="50000"/>
+                                        </a:schemeClr>
+                                      </a:solidFill>
+                                      <a:latin typeface="Cambria Math" panose="02040503050406030204" pitchFamily="18" charset="0"/>
+                                    </a:rPr>
+                                  </m:ctrlPr>
+                                </m:sSubPr>
+                                <m:e>
+                                  <m:r>
+                                    <a:rPr lang="pt-BR" sz="2400" b="0" kern="1200" smtClean="0">
+                                      <a:solidFill>
+                                        <a:schemeClr val="accent5">
+                                          <a:lumMod val="50000"/>
+                                        </a:schemeClr>
+                                      </a:solidFill>
+                                      <a:latin typeface="Cambria Math" panose="02040503050406030204" pitchFamily="18" charset="0"/>
+                                    </a:rPr>
+                                    <m:t>𝒟</m:t>
+                                  </m:r>
+                                </m:e>
+                                <m:sub>
+                                  <m:r>
+                                    <a:rPr lang="en-US" sz="2400" b="0" kern="1200" smtClean="0">
+                                      <a:solidFill>
+                                        <a:schemeClr val="accent5">
+                                          <a:lumMod val="50000"/>
+                                        </a:schemeClr>
+                                      </a:solidFill>
+                                      <a:latin typeface="Cambria Math" panose="02040503050406030204" pitchFamily="18" charset="0"/>
+                                    </a:rPr>
+                                    <m:t>𝐺</m:t>
+                                  </m:r>
+                                  <m:r>
+                                    <a:rPr lang="en-US" sz="2400" b="0" kern="1200" smtClean="0">
+                                      <a:solidFill>
+                                        <a:schemeClr val="accent5">
+                                          <a:lumMod val="50000"/>
+                                        </a:schemeClr>
+                                      </a:solidFill>
+                                      <a:latin typeface="Cambria Math" panose="02040503050406030204" pitchFamily="18" charset="0"/>
+                                    </a:rPr>
+                                    <m:t>,</m:t>
+                                  </m:r>
+                                  <m:r>
+                                    <a:rPr lang="en-US" sz="2400" b="0" kern="1200" smtClean="0">
+                                      <a:solidFill>
+                                        <a:schemeClr val="accent5">
+                                          <a:lumMod val="50000"/>
+                                        </a:schemeClr>
+                                      </a:solidFill>
+                                      <a:latin typeface="Cambria Math" panose="02040503050406030204" pitchFamily="18" charset="0"/>
+                                    </a:rPr>
+                                    <m:t>𝑧</m:t>
+                                  </m:r>
+                                </m:sub>
+                              </m:sSub>
+                              <m:r>
+                                <a:rPr lang="pt-BR" sz="2400" b="0" kern="1200" smtClean="0">
+                                  <a:solidFill>
+                                    <a:schemeClr val="accent5">
+                                      <a:lumMod val="50000"/>
+                                    </a:schemeClr>
+                                  </a:solidFill>
+                                  <a:latin typeface="Cambria Math" panose="02040503050406030204" pitchFamily="18" charset="0"/>
+                                </a:rPr>
+                                <m:t>≝</m:t>
+                              </m:r>
+                              <m:f>
+                                <m:fPr>
+                                  <m:ctrlPr>
+                                    <a:rPr lang="pt-BR" sz="2400" b="0" i="1" kern="1200" smtClean="0">
+                                      <a:solidFill>
+                                        <a:schemeClr val="accent5">
+                                          <a:lumMod val="50000"/>
+                                        </a:schemeClr>
+                                      </a:solidFill>
+                                      <a:latin typeface="Cambria Math" panose="02040503050406030204" pitchFamily="18" charset="0"/>
+                                    </a:rPr>
+                                  </m:ctrlPr>
+                                </m:fPr>
+                                <m:num>
+                                  <m:r>
+                                    <a:rPr lang="en-US" sz="2400" b="0" kern="1200" smtClean="0">
+                                      <a:solidFill>
+                                        <a:schemeClr val="accent5">
+                                          <a:lumMod val="50000"/>
+                                        </a:schemeClr>
+                                      </a:solidFill>
+                                      <a:latin typeface="Cambria Math" panose="02040503050406030204" pitchFamily="18" charset="0"/>
+                                    </a:rPr>
+                                    <m:t>1</m:t>
+                                  </m:r>
+                                </m:num>
+                                <m:den>
+                                  <m:r>
+                                    <a:rPr lang="en-US" sz="2400" b="0" kern="1200" smtClean="0">
+                                      <a:solidFill>
+                                        <a:schemeClr val="accent5">
+                                          <a:lumMod val="50000"/>
+                                        </a:schemeClr>
+                                      </a:solidFill>
+                                      <a:latin typeface="Cambria Math" panose="02040503050406030204" pitchFamily="18" charset="0"/>
+                                    </a:rPr>
+                                    <m:t>2</m:t>
+                                  </m:r>
+                                </m:den>
+                              </m:f>
+                              <m:nary>
+                                <m:naryPr>
+                                  <m:chr m:val="∑"/>
+                                  <m:ctrlPr>
+                                    <a:rPr lang="pt-BR" sz="2400" b="0" i="1" kern="1200" smtClean="0">
+                                      <a:solidFill>
+                                        <a:schemeClr val="accent5">
+                                          <a:lumMod val="50000"/>
+                                        </a:schemeClr>
+                                      </a:solidFill>
+                                      <a:latin typeface="Cambria Math" panose="02040503050406030204" pitchFamily="18" charset="0"/>
+                                    </a:rPr>
+                                  </m:ctrlPr>
+                                </m:naryPr>
+                                <m:sub>
+                                  <m:r>
+                                    <m:rPr>
+                                      <m:brk m:alnAt="23"/>
+                                    </m:rPr>
+                                    <a:rPr lang="en-US" sz="2400" b="0" kern="1200" smtClean="0">
+                                      <a:solidFill>
+                                        <a:schemeClr val="accent5">
+                                          <a:lumMod val="50000"/>
+                                        </a:schemeClr>
+                                      </a:solidFill>
+                                      <a:latin typeface="Cambria Math" panose="02040503050406030204" pitchFamily="18" charset="0"/>
+                                    </a:rPr>
+                                    <m:t>𝑖</m:t>
+                                  </m:r>
+                                  <m:r>
+                                    <a:rPr lang="en-US" sz="2400" b="0" kern="1200" smtClean="0">
+                                      <a:solidFill>
+                                        <a:schemeClr val="accent5">
+                                          <a:lumMod val="50000"/>
+                                        </a:schemeClr>
+                                      </a:solidFill>
+                                      <a:latin typeface="Cambria Math" panose="02040503050406030204" pitchFamily="18" charset="0"/>
+                                    </a:rPr>
+                                    <m:t>=1</m:t>
+                                  </m:r>
+                                </m:sub>
+                                <m:sup>
+                                  <m:r>
+                                    <a:rPr lang="en-US" sz="2400" b="0" kern="1200" smtClean="0">
+                                      <a:solidFill>
+                                        <a:schemeClr val="accent5">
+                                          <a:lumMod val="50000"/>
+                                        </a:schemeClr>
+                                      </a:solidFill>
+                                      <a:latin typeface="Cambria Math" panose="02040503050406030204" pitchFamily="18" charset="0"/>
+                                    </a:rPr>
+                                    <m:t>𝑛</m:t>
+                                  </m:r>
+                                </m:sup>
+                                <m:e>
+                                  <m:nary>
+                                    <m:naryPr>
+                                      <m:chr m:val="∑"/>
+                                      <m:supHide m:val="on"/>
+                                      <m:ctrlPr>
+                                        <a:rPr lang="pt-BR" sz="2400" b="0" i="1" kern="1200" smtClean="0">
+                                          <a:solidFill>
+                                            <a:schemeClr val="accent5">
+                                              <a:lumMod val="50000"/>
+                                            </a:schemeClr>
+                                          </a:solidFill>
+                                          <a:latin typeface="Cambria Math" panose="02040503050406030204" pitchFamily="18" charset="0"/>
+                                        </a:rPr>
+                                      </m:ctrlPr>
+                                    </m:naryPr>
+                                    <m:sub>
+                                      <m:r>
+                                        <m:rPr>
+                                          <m:brk m:alnAt="7"/>
+                                        </m:rPr>
+                                        <a:rPr lang="en-US" sz="2400" b="0" kern="1200" smtClean="0">
+                                          <a:solidFill>
+                                            <a:schemeClr val="accent5">
+                                              <a:lumMod val="50000"/>
+                                            </a:schemeClr>
+                                          </a:solidFill>
+                                          <a:latin typeface="Cambria Math" panose="02040503050406030204" pitchFamily="18" charset="0"/>
+                                        </a:rPr>
+                                        <m:t>𝑗</m:t>
+                                      </m:r>
+                                      <m:r>
+                                        <a:rPr lang="en-US" sz="2400" b="0" kern="1200" smtClean="0">
+                                          <a:solidFill>
+                                            <a:schemeClr val="accent5">
+                                              <a:lumMod val="50000"/>
+                                            </a:schemeClr>
+                                          </a:solidFill>
+                                          <a:latin typeface="Cambria Math" panose="02040503050406030204" pitchFamily="18" charset="0"/>
+                                        </a:rPr>
+                                        <m:t>∈1,..,</m:t>
+                                      </m:r>
+                                      <m:r>
+                                        <a:rPr lang="en-US" sz="2400" b="0" kern="1200" smtClean="0">
+                                          <a:solidFill>
+                                            <a:schemeClr val="accent5">
+                                              <a:lumMod val="50000"/>
+                                            </a:schemeClr>
+                                          </a:solidFill>
+                                          <a:latin typeface="Cambria Math" panose="02040503050406030204" pitchFamily="18" charset="0"/>
+                                        </a:rPr>
+                                        <m:t>𝑛</m:t>
+                                      </m:r>
+                                      <m:r>
+                                        <a:rPr lang="en-US" sz="2400" b="0" kern="1200" smtClean="0">
+                                          <a:solidFill>
+                                            <a:schemeClr val="accent5">
+                                              <a:lumMod val="50000"/>
+                                            </a:schemeClr>
+                                          </a:solidFill>
+                                          <a:latin typeface="Cambria Math" panose="02040503050406030204" pitchFamily="18" charset="0"/>
+                                        </a:rPr>
+                                        <m:t>,</m:t>
+                                      </m:r>
+                                      <m:r>
+                                        <a:rPr lang="en-US" sz="2400" b="0" kern="1200" smtClean="0">
+                                          <a:solidFill>
+                                            <a:schemeClr val="accent5">
+                                              <a:lumMod val="50000"/>
+                                            </a:schemeClr>
+                                          </a:solidFill>
+                                          <a:latin typeface="Cambria Math" panose="02040503050406030204" pitchFamily="18" charset="0"/>
+                                        </a:rPr>
+                                        <m:t>𝑗</m:t>
+                                      </m:r>
+                                      <m:r>
+                                        <a:rPr lang="en-US" sz="2400" b="0" kern="1200" smtClean="0">
+                                          <a:solidFill>
+                                            <a:schemeClr val="accent5">
+                                              <a:lumMod val="50000"/>
+                                            </a:schemeClr>
+                                          </a:solidFill>
+                                          <a:latin typeface="Cambria Math" panose="02040503050406030204" pitchFamily="18" charset="0"/>
+                                        </a:rPr>
+                                        <m:t>≠</m:t>
+                                      </m:r>
+                                      <m:r>
+                                        <a:rPr lang="en-US" sz="2400" b="0" kern="1200" smtClean="0">
+                                          <a:solidFill>
+                                            <a:schemeClr val="accent5">
+                                              <a:lumMod val="50000"/>
+                                            </a:schemeClr>
+                                          </a:solidFill>
+                                          <a:latin typeface="Cambria Math" panose="02040503050406030204" pitchFamily="18" charset="0"/>
+                                        </a:rPr>
+                                        <m:t>𝑖</m:t>
+                                      </m:r>
+                                    </m:sub>
+                                    <m:sup/>
+                                    <m:e>
+                                      <m:sSub>
+                                        <m:sSubPr>
+                                          <m:ctrlPr>
+                                            <a:rPr lang="pt-BR" sz="2400" b="0" i="1" kern="1200" smtClean="0">
+                                              <a:solidFill>
+                                                <a:schemeClr val="accent5">
+                                                  <a:lumMod val="50000"/>
+                                                </a:schemeClr>
+                                              </a:solidFill>
+                                              <a:latin typeface="Cambria Math" panose="02040503050406030204" pitchFamily="18" charset="0"/>
+                                            </a:rPr>
+                                          </m:ctrlPr>
+                                        </m:sSubPr>
+                                        <m:e>
+                                          <m:r>
+                                            <a:rPr lang="en-US" sz="2400" b="0" kern="1200" smtClean="0">
+                                              <a:solidFill>
+                                                <a:schemeClr val="accent5">
+                                                  <a:lumMod val="50000"/>
+                                                </a:schemeClr>
+                                              </a:solidFill>
+                                              <a:latin typeface="Cambria Math" panose="02040503050406030204" pitchFamily="18" charset="0"/>
+                                            </a:rPr>
+                                            <m:t>𝑤</m:t>
+                                          </m:r>
+                                        </m:e>
+                                        <m:sub>
+                                          <m:r>
+                                            <a:rPr lang="en-US" sz="2400" b="0" kern="1200" smtClean="0">
+                                              <a:solidFill>
+                                                <a:schemeClr val="accent5">
+                                                  <a:lumMod val="50000"/>
+                                                </a:schemeClr>
+                                              </a:solidFill>
+                                              <a:latin typeface="Cambria Math" panose="02040503050406030204" pitchFamily="18" charset="0"/>
+                                            </a:rPr>
+                                            <m:t>𝑖𝑗</m:t>
+                                          </m:r>
+                                        </m:sub>
+                                      </m:sSub>
+                                      <m:sSup>
+                                        <m:sSupPr>
+                                          <m:ctrlPr>
+                                            <a:rPr lang="pt-BR" sz="2400" b="0" i="1" kern="1200" smtClean="0">
+                                              <a:solidFill>
+                                                <a:schemeClr val="accent5">
+                                                  <a:lumMod val="50000"/>
+                                                </a:schemeClr>
+                                              </a:solidFill>
+                                              <a:latin typeface="Cambria Math" panose="02040503050406030204" pitchFamily="18" charset="0"/>
+                                            </a:rPr>
+                                          </m:ctrlPr>
+                                        </m:sSupPr>
+                                        <m:e>
+                                          <m:d>
+                                            <m:dPr>
+                                              <m:ctrlPr>
+                                                <a:rPr lang="pt-BR" sz="2400" b="0" i="1" kern="1200" smtClean="0">
+                                                  <a:solidFill>
+                                                    <a:schemeClr val="accent5">
+                                                      <a:lumMod val="50000"/>
+                                                    </a:schemeClr>
+                                                  </a:solidFill>
+                                                  <a:latin typeface="Cambria Math" panose="02040503050406030204" pitchFamily="18" charset="0"/>
+                                                </a:rPr>
+                                              </m:ctrlPr>
+                                            </m:dPr>
+                                            <m:e>
+                                              <m:sSub>
+                                                <m:sSubPr>
+                                                  <m:ctrlPr>
+                                                    <a:rPr lang="pt-BR" sz="2400" b="0" i="1" kern="1200" smtClean="0">
+                                                      <a:solidFill>
+                                                        <a:schemeClr val="accent5">
+                                                          <a:lumMod val="50000"/>
+                                                        </a:schemeClr>
+                                                      </a:solidFill>
+                                                      <a:latin typeface="Cambria Math" panose="02040503050406030204" pitchFamily="18" charset="0"/>
+                                                    </a:rPr>
+                                                  </m:ctrlPr>
+                                                </m:sSubPr>
+                                                <m:e>
+                                                  <m:r>
+                                                    <a:rPr lang="en-US" sz="2400" b="0" kern="1200" smtClean="0">
+                                                      <a:solidFill>
+                                                        <a:schemeClr val="accent5">
+                                                          <a:lumMod val="50000"/>
+                                                        </a:schemeClr>
+                                                      </a:solidFill>
+                                                      <a:latin typeface="Cambria Math" panose="02040503050406030204" pitchFamily="18" charset="0"/>
+                                                    </a:rPr>
+                                                    <m:t>𝑧</m:t>
+                                                  </m:r>
+                                                </m:e>
+                                                <m:sub>
+                                                  <m:r>
+                                                    <a:rPr lang="en-US" sz="2400" b="0" kern="1200" smtClean="0">
+                                                      <a:solidFill>
+                                                        <a:schemeClr val="accent5">
+                                                          <a:lumMod val="50000"/>
+                                                        </a:schemeClr>
+                                                      </a:solidFill>
+                                                      <a:latin typeface="Cambria Math" panose="02040503050406030204" pitchFamily="18" charset="0"/>
+                                                    </a:rPr>
+                                                    <m:t>𝑖</m:t>
+                                                  </m:r>
+                                                </m:sub>
+                                              </m:sSub>
+                                              <m:r>
+                                                <a:rPr lang="en-US" sz="2400" b="0" kern="1200" smtClean="0">
+                                                  <a:solidFill>
+                                                    <a:schemeClr val="accent5">
+                                                      <a:lumMod val="50000"/>
+                                                    </a:schemeClr>
+                                                  </a:solidFill>
+                                                  <a:latin typeface="Cambria Math" panose="02040503050406030204" pitchFamily="18" charset="0"/>
+                                                </a:rPr>
+                                                <m:t>−</m:t>
+                                              </m:r>
+                                              <m:sSub>
+                                                <m:sSubPr>
+                                                  <m:ctrlPr>
+                                                    <a:rPr lang="en-US" sz="2400" b="0" i="1" kern="1200" smtClean="0">
+                                                      <a:solidFill>
+                                                        <a:schemeClr val="accent5">
+                                                          <a:lumMod val="50000"/>
+                                                        </a:schemeClr>
+                                                      </a:solidFill>
+                                                      <a:latin typeface="Cambria Math" panose="02040503050406030204" pitchFamily="18" charset="0"/>
+                                                    </a:rPr>
+                                                  </m:ctrlPr>
+                                                </m:sSubPr>
+                                                <m:e>
+                                                  <m:r>
+                                                    <a:rPr lang="en-US" sz="2400" b="0" kern="1200" smtClean="0">
+                                                      <a:solidFill>
+                                                        <a:schemeClr val="accent5">
+                                                          <a:lumMod val="50000"/>
+                                                        </a:schemeClr>
+                                                      </a:solidFill>
+                                                      <a:latin typeface="Cambria Math" panose="02040503050406030204" pitchFamily="18" charset="0"/>
+                                                    </a:rPr>
+                                                    <m:t>𝑧</m:t>
+                                                  </m:r>
+                                                </m:e>
+                                                <m:sub>
+                                                  <m:r>
+                                                    <a:rPr lang="en-US" sz="2400" b="0" kern="1200" smtClean="0">
+                                                      <a:solidFill>
+                                                        <a:schemeClr val="accent5">
+                                                          <a:lumMod val="50000"/>
+                                                        </a:schemeClr>
+                                                      </a:solidFill>
+                                                      <a:latin typeface="Cambria Math" panose="02040503050406030204" pitchFamily="18" charset="0"/>
+                                                    </a:rPr>
+                                                    <m:t>𝑗</m:t>
+                                                  </m:r>
+                                                </m:sub>
+                                              </m:sSub>
+                                            </m:e>
+                                          </m:d>
+                                        </m:e>
+                                        <m:sup>
+                                          <m:r>
+                                            <a:rPr lang="en-US" sz="2400" b="0" kern="1200" smtClean="0">
+                                              <a:solidFill>
+                                                <a:schemeClr val="accent5">
+                                                  <a:lumMod val="50000"/>
+                                                </a:schemeClr>
+                                              </a:solidFill>
+                                              <a:latin typeface="Cambria Math" panose="02040503050406030204" pitchFamily="18" charset="0"/>
+                                            </a:rPr>
+                                            <m:t>2</m:t>
+                                          </m:r>
+                                        </m:sup>
+                                      </m:sSup>
+                                    </m:e>
+                                  </m:nary>
+                                </m:e>
+                              </m:nary>
+                            </m:oMath>
+                          </a14:m>
+                          <a:endParaRPr lang="nl-BE" sz="2400" b="0" kern="1200" dirty="0">
+                            <a:solidFill>
+                              <a:schemeClr val="accent5">
+                                <a:lumMod val="50000"/>
+                              </a:schemeClr>
+                            </a:solidFill>
+                            <a:latin typeface="Times New Roman" panose="02020603050405020304" pitchFamily="18" charset="0"/>
+                            <a:ea typeface="+mn-ea"/>
+                            <a:cs typeface="Times New Roman" panose="02020603050405020304" pitchFamily="18" charset="0"/>
+                          </a:endParaRPr>
+                        </a:p>
+                      </a:txBody>
+                      <a:tcPr marL="82940" marR="82940" marT="41470" marB="41470"/>
+                    </a:tc>
+                    <a:extLst>
+                      <a:ext uri="{0D108BD9-81ED-4DB2-BD59-A6C34878D82A}">
+                        <a16:rowId xmlns:a16="http://schemas.microsoft.com/office/drawing/2014/main" val="957654837"/>
+                      </a:ext>
+                    </a:extLst>
+                  </a:tr>
+                  <a:tr h="753711">
+                    <a:tc>
+                      <a:txBody>
+                        <a:bodyPr/>
+                        <a:lstStyle/>
+                        <a:p>
+                          <a:r>
+                            <a:rPr lang="en-US" sz="2400" b="0" kern="1200" dirty="0">
+                              <a:solidFill>
+                                <a:schemeClr val="accent5">
+                                  <a:lumMod val="50000"/>
+                                </a:schemeClr>
+                              </a:solidFill>
+                            </a:rPr>
+                            <a:t>Internal</a:t>
+                          </a:r>
+                          <a:r>
+                            <a:rPr lang="en-US" sz="2400" dirty="0"/>
+                            <a:t> </a:t>
+                          </a:r>
+                          <a:r>
+                            <a:rPr lang="en-US" sz="2400" b="0" kern="1200" dirty="0">
+                              <a:solidFill>
+                                <a:schemeClr val="accent5">
+                                  <a:lumMod val="50000"/>
+                                </a:schemeClr>
+                              </a:solidFill>
+                            </a:rPr>
+                            <a:t>conflict</a:t>
+                          </a:r>
+                          <a:endParaRPr lang="nl-BE" sz="2400" b="0" kern="1200" dirty="0">
+                            <a:solidFill>
+                              <a:schemeClr val="accent5">
+                                <a:lumMod val="50000"/>
+                              </a:schemeClr>
+                            </a:solidFill>
+                            <a:latin typeface="Times New Roman" panose="02020603050405020304" pitchFamily="18" charset="0"/>
+                            <a:ea typeface="+mn-ea"/>
+                            <a:cs typeface="Times New Roman" panose="02020603050405020304" pitchFamily="18" charset="0"/>
+                          </a:endParaRPr>
+                        </a:p>
+                      </a:txBody>
+                      <a:tcPr marL="82940" marR="82940" marT="41470" marB="41470"/>
+                    </a:tc>
+                    <a:tc>
+                      <a:txBody>
+                        <a:bodyPr/>
+                        <a:lstStyle/>
+                        <a:p>
+                          <a:pPr algn="ctr"/>
+                          <a:r>
+                            <a:rPr lang="en-US" sz="2000" b="0" kern="1200" dirty="0">
+                              <a:solidFill>
+                                <a:schemeClr val="accent5">
+                                  <a:lumMod val="50000"/>
+                                </a:schemeClr>
+                              </a:solidFill>
+                            </a:rPr>
+                            <a:t>Misalignment innate (</a:t>
+                          </a:r>
+                          <a14:m>
+                            <m:oMath xmlns:m="http://schemas.openxmlformats.org/officeDocument/2006/math">
+                              <m:sSub>
+                                <m:sSubPr>
+                                  <m:ctrlPr>
+                                    <a:rPr lang="pt-BR" sz="2000" b="0" i="1" kern="1200" smtClean="0">
+                                      <a:solidFill>
+                                        <a:schemeClr val="accent5">
+                                          <a:lumMod val="50000"/>
+                                        </a:schemeClr>
+                                      </a:solidFill>
+                                      <a:latin typeface="Cambria Math" panose="02040503050406030204" pitchFamily="18" charset="0"/>
+                                    </a:rPr>
+                                  </m:ctrlPr>
+                                </m:sSubPr>
+                                <m:e>
+                                  <m:r>
+                                    <a:rPr lang="en-US" sz="2000" b="0" kern="1200" smtClean="0">
+                                      <a:solidFill>
+                                        <a:schemeClr val="accent5">
+                                          <a:lumMod val="50000"/>
+                                        </a:schemeClr>
+                                      </a:solidFill>
+                                      <a:latin typeface="Cambria Math" panose="02040503050406030204" pitchFamily="18" charset="0"/>
+                                    </a:rPr>
+                                    <m:t>𝑠</m:t>
+                                  </m:r>
+                                </m:e>
+                                <m:sub>
+                                  <m:r>
+                                    <a:rPr lang="en-US" sz="2000" b="0" kern="1200" smtClean="0">
+                                      <a:solidFill>
+                                        <a:schemeClr val="accent5">
+                                          <a:lumMod val="50000"/>
+                                        </a:schemeClr>
+                                      </a:solidFill>
+                                      <a:latin typeface="Cambria Math" panose="02040503050406030204" pitchFamily="18" charset="0"/>
+                                    </a:rPr>
+                                    <m:t>𝑖</m:t>
+                                  </m:r>
+                                </m:sub>
+                              </m:sSub>
+                            </m:oMath>
+                          </a14:m>
+                          <a:r>
+                            <a:rPr lang="en-US" sz="2000" b="0" kern="1200" dirty="0">
+                              <a:solidFill>
+                                <a:schemeClr val="accent5">
+                                  <a:lumMod val="50000"/>
+                                </a:schemeClr>
+                              </a:solidFill>
+                            </a:rPr>
+                            <a:t>) and expressed opinion (</a:t>
+                          </a:r>
+                          <a14:m>
+                            <m:oMath xmlns:m="http://schemas.openxmlformats.org/officeDocument/2006/math">
+                              <m:sSub>
+                                <m:sSubPr>
+                                  <m:ctrlPr>
+                                    <a:rPr lang="pt-BR" sz="2000" b="0" i="1" kern="1200" smtClean="0">
+                                      <a:solidFill>
+                                        <a:schemeClr val="accent5">
+                                          <a:lumMod val="50000"/>
+                                        </a:schemeClr>
+                                      </a:solidFill>
+                                      <a:latin typeface="Cambria Math" panose="02040503050406030204" pitchFamily="18" charset="0"/>
+                                    </a:rPr>
+                                  </m:ctrlPr>
+                                </m:sSubPr>
+                                <m:e>
+                                  <m:r>
+                                    <a:rPr lang="en-US" sz="2000" b="0" kern="1200" smtClean="0">
+                                      <a:solidFill>
+                                        <a:schemeClr val="accent5">
+                                          <a:lumMod val="50000"/>
+                                        </a:schemeClr>
+                                      </a:solidFill>
+                                      <a:latin typeface="Cambria Math" panose="02040503050406030204" pitchFamily="18" charset="0"/>
+                                    </a:rPr>
+                                    <m:t>𝑧</m:t>
+                                  </m:r>
+                                </m:e>
+                                <m:sub>
+                                  <m:r>
+                                    <a:rPr lang="en-US" sz="2000" b="0" kern="1200" smtClean="0">
+                                      <a:solidFill>
+                                        <a:schemeClr val="accent5">
+                                          <a:lumMod val="50000"/>
+                                        </a:schemeClr>
+                                      </a:solidFill>
+                                      <a:latin typeface="Cambria Math" panose="02040503050406030204" pitchFamily="18" charset="0"/>
+                                    </a:rPr>
+                                    <m:t>𝑖</m:t>
+                                  </m:r>
+                                </m:sub>
+                              </m:sSub>
+                            </m:oMath>
+                          </a14:m>
+                          <a:r>
+                            <a:rPr lang="en-US" sz="2000" b="0" kern="1200" dirty="0">
+                              <a:solidFill>
+                                <a:schemeClr val="accent5">
+                                  <a:lumMod val="50000"/>
+                                </a:schemeClr>
+                              </a:solidFill>
+                            </a:rPr>
+                            <a:t>)</a:t>
+                          </a:r>
+                        </a:p>
+                        <a:p>
+                          <a:pPr algn="ctr"/>
+                          <a:r>
+                            <a:rPr lang="pt-BR" sz="2400" b="0" kern="1200" dirty="0">
+                              <a:solidFill>
+                                <a:schemeClr val="accent5">
+                                  <a:lumMod val="50000"/>
+                                </a:schemeClr>
+                              </a:solidFill>
+                            </a:rPr>
+                            <a:t> </a:t>
+                          </a:r>
+                          <a14:m>
+                            <m:oMath xmlns:m="http://schemas.openxmlformats.org/officeDocument/2006/math">
+                              <m:sSub>
+                                <m:sSubPr>
+                                  <m:ctrlPr>
+                                    <a:rPr lang="en-US" sz="2400" b="0" i="1" kern="1200" smtClean="0">
+                                      <a:solidFill>
+                                        <a:schemeClr val="accent5">
+                                          <a:lumMod val="50000"/>
+                                        </a:schemeClr>
+                                      </a:solidFill>
+                                      <a:latin typeface="Cambria Math" panose="02040503050406030204" pitchFamily="18" charset="0"/>
+                                    </a:rPr>
+                                  </m:ctrlPr>
+                                </m:sSubPr>
+                                <m:e>
+                                  <m:r>
+                                    <a:rPr lang="en-US" sz="2400" b="0" kern="1200" smtClean="0">
+                                      <a:solidFill>
+                                        <a:schemeClr val="accent5">
+                                          <a:lumMod val="50000"/>
+                                        </a:schemeClr>
+                                      </a:solidFill>
+                                      <a:latin typeface="Cambria Math" panose="02040503050406030204" pitchFamily="18" charset="0"/>
+                                    </a:rPr>
+                                    <m:t>𝐼</m:t>
+                                  </m:r>
+                                </m:e>
+                                <m:sub>
+                                  <m:r>
+                                    <a:rPr lang="en-US" sz="2400" b="0" kern="1200" smtClean="0">
+                                      <a:solidFill>
+                                        <a:schemeClr val="accent5">
+                                          <a:lumMod val="50000"/>
+                                        </a:schemeClr>
+                                      </a:solidFill>
+                                      <a:latin typeface="Cambria Math" panose="02040503050406030204" pitchFamily="18" charset="0"/>
+                                    </a:rPr>
+                                    <m:t>𝑍</m:t>
+                                  </m:r>
+                                  <m:r>
+                                    <a:rPr lang="en-US" sz="2400" b="0" kern="1200" smtClean="0">
+                                      <a:solidFill>
+                                        <a:schemeClr val="accent5">
+                                          <a:lumMod val="50000"/>
+                                        </a:schemeClr>
+                                      </a:solidFill>
+                                      <a:latin typeface="Cambria Math" panose="02040503050406030204" pitchFamily="18" charset="0"/>
+                                    </a:rPr>
+                                    <m:t>,</m:t>
+                                  </m:r>
+                                  <m:r>
+                                    <a:rPr lang="en-US" sz="2400" b="0" kern="1200" smtClean="0">
+                                      <a:solidFill>
+                                        <a:schemeClr val="accent5">
+                                          <a:lumMod val="50000"/>
+                                        </a:schemeClr>
+                                      </a:solidFill>
+                                      <a:latin typeface="Cambria Math" panose="02040503050406030204" pitchFamily="18" charset="0"/>
+                                    </a:rPr>
+                                    <m:t>𝑆</m:t>
+                                  </m:r>
+                                </m:sub>
+                              </m:sSub>
+                              <m:r>
+                                <a:rPr lang="en-US" sz="2400" b="0" kern="1200" smtClean="0">
+                                  <a:solidFill>
+                                    <a:schemeClr val="accent5">
+                                      <a:lumMod val="50000"/>
+                                    </a:schemeClr>
+                                  </a:solidFill>
+                                  <a:latin typeface="Cambria Math" panose="02040503050406030204" pitchFamily="18" charset="0"/>
+                                </a:rPr>
+                                <m:t>≝</m:t>
+                              </m:r>
+                              <m:nary>
+                                <m:naryPr>
+                                  <m:chr m:val="∑"/>
+                                  <m:limLoc m:val="subSup"/>
+                                  <m:ctrlPr>
+                                    <a:rPr lang="en-US" sz="2400" b="0" i="1" kern="1200" smtClean="0">
+                                      <a:solidFill>
+                                        <a:schemeClr val="accent5">
+                                          <a:lumMod val="50000"/>
+                                        </a:schemeClr>
+                                      </a:solidFill>
+                                      <a:latin typeface="Cambria Math" panose="02040503050406030204" pitchFamily="18" charset="0"/>
+                                    </a:rPr>
+                                  </m:ctrlPr>
+                                </m:naryPr>
+                                <m:sub>
+                                  <m:r>
+                                    <m:rPr>
+                                      <m:brk m:alnAt="25"/>
+                                    </m:rPr>
+                                    <a:rPr lang="en-US" sz="2400" b="0" kern="1200" smtClean="0">
+                                      <a:solidFill>
+                                        <a:schemeClr val="accent5">
+                                          <a:lumMod val="50000"/>
+                                        </a:schemeClr>
+                                      </a:solidFill>
+                                      <a:latin typeface="Cambria Math" panose="02040503050406030204" pitchFamily="18" charset="0"/>
+                                    </a:rPr>
+                                    <m:t>𝑖</m:t>
+                                  </m:r>
+                                  <m:r>
+                                    <a:rPr lang="en-US" sz="2400" b="0" kern="1200" smtClean="0">
+                                      <a:solidFill>
+                                        <a:schemeClr val="accent5">
+                                          <a:lumMod val="50000"/>
+                                        </a:schemeClr>
+                                      </a:solidFill>
+                                      <a:latin typeface="Cambria Math" panose="02040503050406030204" pitchFamily="18" charset="0"/>
+                                    </a:rPr>
+                                    <m:t>=1</m:t>
+                                  </m:r>
+                                </m:sub>
+                                <m:sup>
+                                  <m:r>
+                                    <a:rPr lang="en-US" sz="2400" b="0" kern="1200" smtClean="0">
+                                      <a:solidFill>
+                                        <a:schemeClr val="accent5">
+                                          <a:lumMod val="50000"/>
+                                        </a:schemeClr>
+                                      </a:solidFill>
+                                      <a:latin typeface="Cambria Math" panose="02040503050406030204" pitchFamily="18" charset="0"/>
+                                    </a:rPr>
+                                    <m:t>𝑛</m:t>
+                                  </m:r>
+                                </m:sup>
+                                <m:e>
+                                  <m:sSup>
+                                    <m:sSupPr>
+                                      <m:ctrlPr>
+                                        <a:rPr lang="en-US" sz="2400" b="0" i="1" kern="1200" smtClean="0">
+                                          <a:solidFill>
+                                            <a:schemeClr val="accent5">
+                                              <a:lumMod val="50000"/>
+                                            </a:schemeClr>
+                                          </a:solidFill>
+                                          <a:latin typeface="Cambria Math" panose="02040503050406030204" pitchFamily="18" charset="0"/>
+                                        </a:rPr>
+                                      </m:ctrlPr>
+                                    </m:sSupPr>
+                                    <m:e>
+                                      <m:d>
+                                        <m:dPr>
+                                          <m:ctrlPr>
+                                            <a:rPr lang="en-US" sz="2400" b="0" i="1" kern="1200" smtClean="0">
+                                              <a:solidFill>
+                                                <a:schemeClr val="accent5">
+                                                  <a:lumMod val="50000"/>
+                                                </a:schemeClr>
+                                              </a:solidFill>
+                                              <a:latin typeface="Cambria Math" panose="02040503050406030204" pitchFamily="18" charset="0"/>
+                                            </a:rPr>
+                                          </m:ctrlPr>
+                                        </m:dPr>
+                                        <m:e>
+                                          <m:sSub>
+                                            <m:sSubPr>
+                                              <m:ctrlPr>
+                                                <a:rPr lang="en-US" sz="2400" b="0" i="1" kern="1200" smtClean="0">
+                                                  <a:solidFill>
+                                                    <a:schemeClr val="accent5">
+                                                      <a:lumMod val="50000"/>
+                                                    </a:schemeClr>
+                                                  </a:solidFill>
+                                                  <a:latin typeface="Cambria Math" panose="02040503050406030204" pitchFamily="18" charset="0"/>
+                                                </a:rPr>
+                                              </m:ctrlPr>
+                                            </m:sSubPr>
+                                            <m:e>
+                                              <m:r>
+                                                <a:rPr lang="en-US" sz="2400" b="0" kern="1200" smtClean="0">
+                                                  <a:solidFill>
+                                                    <a:schemeClr val="accent5">
+                                                      <a:lumMod val="50000"/>
+                                                    </a:schemeClr>
+                                                  </a:solidFill>
+                                                  <a:latin typeface="Cambria Math" panose="02040503050406030204" pitchFamily="18" charset="0"/>
+                                                </a:rPr>
+                                                <m:t>𝑧</m:t>
+                                              </m:r>
+                                            </m:e>
+                                            <m:sub>
+                                              <m:r>
+                                                <a:rPr lang="en-US" sz="2400" b="0" kern="1200" smtClean="0">
+                                                  <a:solidFill>
+                                                    <a:schemeClr val="accent5">
+                                                      <a:lumMod val="50000"/>
+                                                    </a:schemeClr>
+                                                  </a:solidFill>
+                                                  <a:latin typeface="Cambria Math" panose="02040503050406030204" pitchFamily="18" charset="0"/>
+                                                </a:rPr>
+                                                <m:t>𝑖</m:t>
+                                              </m:r>
+                                            </m:sub>
+                                          </m:sSub>
+                                          <m:r>
+                                            <a:rPr lang="en-US" sz="2400" b="0" kern="1200" smtClean="0">
+                                              <a:solidFill>
+                                                <a:schemeClr val="accent5">
+                                                  <a:lumMod val="50000"/>
+                                                </a:schemeClr>
+                                              </a:solidFill>
+                                              <a:latin typeface="Cambria Math" panose="02040503050406030204" pitchFamily="18" charset="0"/>
+                                            </a:rPr>
+                                            <m:t>−</m:t>
+                                          </m:r>
+                                          <m:sSub>
+                                            <m:sSubPr>
+                                              <m:ctrlPr>
+                                                <a:rPr lang="en-US" sz="2400" b="0" i="1" kern="1200" smtClean="0">
+                                                  <a:solidFill>
+                                                    <a:schemeClr val="accent5">
+                                                      <a:lumMod val="50000"/>
+                                                    </a:schemeClr>
+                                                  </a:solidFill>
+                                                  <a:latin typeface="Cambria Math" panose="02040503050406030204" pitchFamily="18" charset="0"/>
+                                                </a:rPr>
+                                              </m:ctrlPr>
+                                            </m:sSubPr>
+                                            <m:e>
+                                              <m:r>
+                                                <a:rPr lang="en-US" sz="2400" b="0" kern="1200" smtClean="0">
+                                                  <a:solidFill>
+                                                    <a:schemeClr val="accent5">
+                                                      <a:lumMod val="50000"/>
+                                                    </a:schemeClr>
+                                                  </a:solidFill>
+                                                  <a:latin typeface="Cambria Math" panose="02040503050406030204" pitchFamily="18" charset="0"/>
+                                                </a:rPr>
+                                                <m:t>𝑠</m:t>
+                                              </m:r>
+                                            </m:e>
+                                            <m:sub>
+                                              <m:r>
+                                                <a:rPr lang="en-US" sz="2400" b="0" kern="1200" smtClean="0">
+                                                  <a:solidFill>
+                                                    <a:schemeClr val="accent5">
+                                                      <a:lumMod val="50000"/>
+                                                    </a:schemeClr>
+                                                  </a:solidFill>
+                                                  <a:latin typeface="Cambria Math" panose="02040503050406030204" pitchFamily="18" charset="0"/>
+                                                </a:rPr>
+                                                <m:t>𝑖</m:t>
+                                              </m:r>
+                                            </m:sub>
+                                          </m:sSub>
+                                        </m:e>
+                                      </m:d>
+                                    </m:e>
+                                    <m:sup>
+                                      <m:r>
+                                        <a:rPr lang="en-US" sz="2400" b="0" kern="1200" smtClean="0">
+                                          <a:solidFill>
+                                            <a:schemeClr val="accent5">
+                                              <a:lumMod val="50000"/>
+                                            </a:schemeClr>
+                                          </a:solidFill>
+                                          <a:latin typeface="Cambria Math" panose="02040503050406030204" pitchFamily="18" charset="0"/>
+                                        </a:rPr>
+                                        <m:t>2</m:t>
+                                      </m:r>
+                                    </m:sup>
+                                  </m:sSup>
+                                </m:e>
+                              </m:nary>
+                            </m:oMath>
+                          </a14:m>
+                          <a:endParaRPr lang="en-US" sz="2800" b="0" kern="1200" dirty="0">
+                            <a:solidFill>
+                              <a:schemeClr val="accent5">
+                                <a:lumMod val="50000"/>
+                              </a:schemeClr>
+                            </a:solidFill>
+                            <a:latin typeface="Times New Roman" panose="02020603050405020304" pitchFamily="18" charset="0"/>
+                            <a:ea typeface="+mn-ea"/>
+                            <a:cs typeface="Times New Roman" panose="02020603050405020304" pitchFamily="18" charset="0"/>
+                          </a:endParaRPr>
+                        </a:p>
+                      </a:txBody>
+                      <a:tcPr marL="82940" marR="82940" marT="41470" marB="41470"/>
+                    </a:tc>
+                    <a:extLst>
+                      <a:ext uri="{0D108BD9-81ED-4DB2-BD59-A6C34878D82A}">
+                        <a16:rowId xmlns:a16="http://schemas.microsoft.com/office/drawing/2014/main" val="3563092955"/>
+                      </a:ext>
+                    </a:extLst>
+                  </a:tr>
+                  <a:tr h="780737">
+                    <a:tc>
+                      <a:txBody>
+                        <a:bodyPr/>
+                        <a:lstStyle/>
+                        <a:p>
+                          <a:r>
+                            <a:rPr lang="en-US" sz="2400" b="0" kern="1200" dirty="0">
+                              <a:solidFill>
+                                <a:schemeClr val="accent5">
+                                  <a:lumMod val="50000"/>
+                                </a:schemeClr>
+                              </a:solidFill>
+                            </a:rPr>
+                            <a:t>Network</a:t>
+                          </a:r>
+                          <a:r>
+                            <a:rPr lang="en-US" sz="2400" dirty="0"/>
+                            <a:t> </a:t>
+                          </a:r>
+                          <a:r>
+                            <a:rPr lang="en-US" sz="2400" b="0" kern="1200" dirty="0">
+                              <a:solidFill>
+                                <a:schemeClr val="accent5">
+                                  <a:lumMod val="50000"/>
+                                </a:schemeClr>
+                              </a:solidFill>
+                            </a:rPr>
+                            <a:t>administrator</a:t>
+                          </a:r>
+                          <a:r>
+                            <a:rPr lang="en-US" sz="2400" dirty="0"/>
+                            <a:t> </a:t>
+                          </a:r>
+                          <a:r>
+                            <a:rPr lang="en-US" sz="2400" b="0" kern="1200" dirty="0">
+                              <a:solidFill>
+                                <a:schemeClr val="accent5">
+                                  <a:lumMod val="50000"/>
+                                </a:schemeClr>
+                              </a:solidFill>
+                            </a:rPr>
+                            <a:t>dynamics</a:t>
+                          </a:r>
+                          <a:endParaRPr lang="nl-BE" sz="2400" b="0" kern="1200" dirty="0">
+                            <a:solidFill>
+                              <a:schemeClr val="accent5">
+                                <a:lumMod val="50000"/>
+                              </a:schemeClr>
+                            </a:solidFill>
+                            <a:latin typeface="Times New Roman" panose="02020603050405020304" pitchFamily="18" charset="0"/>
+                            <a:ea typeface="+mn-ea"/>
+                            <a:cs typeface="Times New Roman" panose="02020603050405020304" pitchFamily="18" charset="0"/>
+                          </a:endParaRPr>
+                        </a:p>
+                      </a:txBody>
+                      <a:tcPr marL="82940" marR="82940" marT="41470" marB="41470"/>
+                    </a:tc>
+                    <a:tc>
+                      <a:txBody>
+                        <a:bodyPr/>
+                        <a:lstStyle/>
+                        <a:p>
+                          <a:endParaRPr lang="nl-BE" sz="2400" dirty="0">
+                            <a:latin typeface="Times New Roman" panose="02020603050405020304" pitchFamily="18" charset="0"/>
+                            <a:cs typeface="Times New Roman" panose="02020603050405020304" pitchFamily="18" charset="0"/>
+                          </a:endParaRPr>
+                        </a:p>
+                      </a:txBody>
+                      <a:tcPr marL="82940" marR="82940" marT="41470" marB="41470"/>
+                    </a:tc>
+                    <a:extLst>
+                      <a:ext uri="{0D108BD9-81ED-4DB2-BD59-A6C34878D82A}">
+                        <a16:rowId xmlns:a16="http://schemas.microsoft.com/office/drawing/2014/main" val="2632569706"/>
+                      </a:ext>
+                    </a:extLst>
+                  </a:tr>
+                </a:tbl>
+              </a:graphicData>
+            </a:graphic>
+          </p:graphicFrame>
+        </mc:Choice>
+        <mc:Fallback xmlns="">
+          <p:graphicFrame>
+            <p:nvGraphicFramePr>
+              <p:cNvPr id="10" name="Tabel 10">
+                <a:extLst>
+                  <a:ext uri="{FF2B5EF4-FFF2-40B4-BE49-F238E27FC236}">
+                    <a16:creationId xmlns:a16="http://schemas.microsoft.com/office/drawing/2014/main" id="{8BBFC0D3-9DEC-4FAE-BC70-AD3B538B0F1D}"/>
+                  </a:ext>
+                </a:extLst>
+              </p:cNvPr>
+              <p:cNvGraphicFramePr>
+                <a:graphicFrameLocks noGrp="1"/>
+              </p:cNvGraphicFramePr>
+              <p:nvPr>
+                <p:extLst>
+                  <p:ext uri="{D42A27DB-BD31-4B8C-83A1-F6EECF244321}">
+                    <p14:modId xmlns:p14="http://schemas.microsoft.com/office/powerpoint/2010/main" val="17848649"/>
+                  </p:ext>
+                </p:extLst>
+              </p:nvPr>
+            </p:nvGraphicFramePr>
+            <p:xfrm>
+              <a:off x="10149824" y="3120119"/>
+              <a:ext cx="8981577" cy="3421289"/>
+            </p:xfrm>
+            <a:graphic>
+              <a:graphicData uri="http://schemas.openxmlformats.org/drawingml/2006/table">
+                <a:tbl>
+                  <a:tblPr firstRow="1" bandRow="1">
+                    <a:tableStyleId>{3B4B98B0-60AC-42C2-AFA5-B58CD77FA1E5}</a:tableStyleId>
+                  </a:tblPr>
+                  <a:tblGrid>
+                    <a:gridCol w="3108976">
+                      <a:extLst>
+                        <a:ext uri="{9D8B030D-6E8A-4147-A177-3AD203B41FA5}">
+                          <a16:colId xmlns:a16="http://schemas.microsoft.com/office/drawing/2014/main" val="525672547"/>
+                        </a:ext>
+                      </a:extLst>
+                    </a:gridCol>
+                    <a:gridCol w="5872601">
+                      <a:extLst>
+                        <a:ext uri="{9D8B030D-6E8A-4147-A177-3AD203B41FA5}">
+                          <a16:colId xmlns:a16="http://schemas.microsoft.com/office/drawing/2014/main" val="2807499271"/>
+                        </a:ext>
+                      </a:extLst>
+                    </a:gridCol>
+                  </a:tblGrid>
+                  <a:tr h="882151">
+                    <a:tc>
+                      <a:txBody>
+                        <a:bodyPr/>
+                        <a:lstStyle/>
+                        <a:p>
+                          <a:r>
+                            <a:rPr lang="en-US" sz="2400" b="0" kern="1200" dirty="0">
+                              <a:solidFill>
+                                <a:schemeClr val="accent5">
+                                  <a:lumMod val="50000"/>
+                                </a:schemeClr>
+                              </a:solidFill>
+                            </a:rPr>
+                            <a:t>Polarization</a:t>
+                          </a:r>
+                          <a:endParaRPr lang="nl-BE" sz="2400" b="0" kern="1200" dirty="0">
+                            <a:solidFill>
+                              <a:schemeClr val="accent5">
+                                <a:lumMod val="50000"/>
+                              </a:schemeClr>
+                            </a:solidFill>
+                            <a:latin typeface="Times New Roman" panose="02020603050405020304" pitchFamily="18" charset="0"/>
+                            <a:ea typeface="+mn-ea"/>
+                            <a:cs typeface="Times New Roman" panose="02020603050405020304" pitchFamily="18" charset="0"/>
+                          </a:endParaRPr>
+                        </a:p>
+                      </a:txBody>
+                      <a:tcPr marL="82940" marR="82940" marT="41470" marB="41470"/>
+                    </a:tc>
+                    <a:tc>
+                      <a:txBody>
+                        <a:bodyPr/>
+                        <a:lstStyle/>
+                        <a:p>
+                          <a:endParaRPr lang="nl-BE"/>
+                        </a:p>
+                      </a:txBody>
+                      <a:tcPr marL="82940" marR="82940" marT="41470" marB="41470">
+                        <a:blipFill>
+                          <a:blip r:embed="rId7"/>
+                          <a:stretch>
+                            <a:fillRect l="-53008" t="-5517" r="-104" b="-304138"/>
+                          </a:stretch>
+                        </a:blipFill>
+                      </a:tcPr>
+                    </a:tc>
+                    <a:extLst>
+                      <a:ext uri="{0D108BD9-81ED-4DB2-BD59-A6C34878D82A}">
+                        <a16:rowId xmlns:a16="http://schemas.microsoft.com/office/drawing/2014/main" val="2131681267"/>
+                      </a:ext>
+                    </a:extLst>
+                  </a:tr>
+                  <a:tr h="938412">
+                    <a:tc>
+                      <a:txBody>
+                        <a:bodyPr/>
+                        <a:lstStyle/>
+                        <a:p>
+                          <a:r>
+                            <a:rPr lang="en-US" sz="2400" b="0" kern="1200" dirty="0">
+                              <a:solidFill>
+                                <a:schemeClr val="accent5">
+                                  <a:lumMod val="50000"/>
+                                </a:schemeClr>
+                              </a:solidFill>
+                            </a:rPr>
+                            <a:t>Disagreement</a:t>
+                          </a:r>
+                          <a:endParaRPr lang="nl-BE" sz="2400" b="0" kern="1200" dirty="0">
+                            <a:solidFill>
+                              <a:schemeClr val="accent5">
+                                <a:lumMod val="50000"/>
+                              </a:schemeClr>
+                            </a:solidFill>
+                            <a:latin typeface="Times New Roman" panose="02020603050405020304" pitchFamily="18" charset="0"/>
+                            <a:ea typeface="+mn-ea"/>
+                            <a:cs typeface="Times New Roman" panose="02020603050405020304" pitchFamily="18" charset="0"/>
+                          </a:endParaRPr>
+                        </a:p>
+                      </a:txBody>
+                      <a:tcPr marL="82940" marR="82940" marT="41470" marB="41470"/>
+                    </a:tc>
+                    <a:tc>
+                      <a:txBody>
+                        <a:bodyPr/>
+                        <a:lstStyle/>
+                        <a:p>
+                          <a:endParaRPr lang="nl-BE"/>
+                        </a:p>
+                      </a:txBody>
+                      <a:tcPr marL="82940" marR="82940" marT="41470" marB="41470">
+                        <a:blipFill>
+                          <a:blip r:embed="rId7"/>
+                          <a:stretch>
+                            <a:fillRect l="-53008" t="-98710" r="-104" b="-184516"/>
+                          </a:stretch>
+                        </a:blipFill>
+                      </a:tcPr>
+                    </a:tc>
+                    <a:extLst>
+                      <a:ext uri="{0D108BD9-81ED-4DB2-BD59-A6C34878D82A}">
+                        <a16:rowId xmlns:a16="http://schemas.microsoft.com/office/drawing/2014/main" val="957654837"/>
+                      </a:ext>
+                    </a:extLst>
+                  </a:tr>
+                  <a:tr h="786266">
+                    <a:tc>
+                      <a:txBody>
+                        <a:bodyPr/>
+                        <a:lstStyle/>
+                        <a:p>
+                          <a:r>
+                            <a:rPr lang="en-US" sz="2400" b="0" kern="1200" dirty="0">
+                              <a:solidFill>
+                                <a:schemeClr val="accent5">
+                                  <a:lumMod val="50000"/>
+                                </a:schemeClr>
+                              </a:solidFill>
+                            </a:rPr>
+                            <a:t>Internal</a:t>
+                          </a:r>
+                          <a:r>
+                            <a:rPr lang="en-US" sz="2400" dirty="0"/>
+                            <a:t> </a:t>
+                          </a:r>
+                          <a:r>
+                            <a:rPr lang="en-US" sz="2400" b="0" kern="1200" dirty="0">
+                              <a:solidFill>
+                                <a:schemeClr val="accent5">
+                                  <a:lumMod val="50000"/>
+                                </a:schemeClr>
+                              </a:solidFill>
+                            </a:rPr>
+                            <a:t>conflict</a:t>
+                          </a:r>
+                          <a:endParaRPr lang="nl-BE" sz="2400" b="0" kern="1200" dirty="0">
+                            <a:solidFill>
+                              <a:schemeClr val="accent5">
+                                <a:lumMod val="50000"/>
+                              </a:schemeClr>
+                            </a:solidFill>
+                            <a:latin typeface="Times New Roman" panose="02020603050405020304" pitchFamily="18" charset="0"/>
+                            <a:ea typeface="+mn-ea"/>
+                            <a:cs typeface="Times New Roman" panose="02020603050405020304" pitchFamily="18" charset="0"/>
+                          </a:endParaRPr>
+                        </a:p>
+                      </a:txBody>
+                      <a:tcPr marL="82940" marR="82940" marT="41470" marB="41470"/>
+                    </a:tc>
+                    <a:tc>
+                      <a:txBody>
+                        <a:bodyPr/>
+                        <a:lstStyle/>
+                        <a:p>
+                          <a:endParaRPr lang="nl-BE"/>
+                        </a:p>
+                      </a:txBody>
+                      <a:tcPr marL="82940" marR="82940" marT="41470" marB="41470">
+                        <a:blipFill>
+                          <a:blip r:embed="rId7"/>
+                          <a:stretch>
+                            <a:fillRect l="-53008" t="-238760" r="-104" b="-121705"/>
+                          </a:stretch>
+                        </a:blipFill>
+                      </a:tcPr>
+                    </a:tc>
+                    <a:extLst>
+                      <a:ext uri="{0D108BD9-81ED-4DB2-BD59-A6C34878D82A}">
+                        <a16:rowId xmlns:a16="http://schemas.microsoft.com/office/drawing/2014/main" val="3563092955"/>
+                      </a:ext>
+                    </a:extLst>
+                  </a:tr>
+                  <a:tr h="814460">
+                    <a:tc>
+                      <a:txBody>
+                        <a:bodyPr/>
+                        <a:lstStyle/>
+                        <a:p>
+                          <a:r>
+                            <a:rPr lang="en-US" sz="2400" b="0" kern="1200" dirty="0">
+                              <a:solidFill>
+                                <a:schemeClr val="accent5">
+                                  <a:lumMod val="50000"/>
+                                </a:schemeClr>
+                              </a:solidFill>
+                            </a:rPr>
+                            <a:t>Network</a:t>
+                          </a:r>
+                          <a:r>
+                            <a:rPr lang="en-US" sz="2400" dirty="0"/>
+                            <a:t> </a:t>
+                          </a:r>
+                          <a:r>
+                            <a:rPr lang="en-US" sz="2400" b="0" kern="1200" dirty="0">
+                              <a:solidFill>
+                                <a:schemeClr val="accent5">
+                                  <a:lumMod val="50000"/>
+                                </a:schemeClr>
+                              </a:solidFill>
+                            </a:rPr>
+                            <a:t>administrator</a:t>
+                          </a:r>
+                          <a:r>
+                            <a:rPr lang="en-US" sz="2400" dirty="0"/>
+                            <a:t> </a:t>
+                          </a:r>
+                          <a:r>
+                            <a:rPr lang="en-US" sz="2400" b="0" kern="1200" dirty="0">
+                              <a:solidFill>
+                                <a:schemeClr val="accent5">
+                                  <a:lumMod val="50000"/>
+                                </a:schemeClr>
+                              </a:solidFill>
+                            </a:rPr>
+                            <a:t>dynamics</a:t>
+                          </a:r>
+                          <a:endParaRPr lang="nl-BE" sz="2400" b="0" kern="1200" dirty="0">
+                            <a:solidFill>
+                              <a:schemeClr val="accent5">
+                                <a:lumMod val="50000"/>
+                              </a:schemeClr>
+                            </a:solidFill>
+                            <a:latin typeface="Times New Roman" panose="02020603050405020304" pitchFamily="18" charset="0"/>
+                            <a:ea typeface="+mn-ea"/>
+                            <a:cs typeface="Times New Roman" panose="02020603050405020304" pitchFamily="18" charset="0"/>
+                          </a:endParaRPr>
+                        </a:p>
+                      </a:txBody>
+                      <a:tcPr marL="82940" marR="82940" marT="41470" marB="41470"/>
+                    </a:tc>
+                    <a:tc>
+                      <a:txBody>
+                        <a:bodyPr/>
+                        <a:lstStyle/>
+                        <a:p>
+                          <a:endParaRPr lang="nl-BE" sz="2400" dirty="0">
+                            <a:latin typeface="Times New Roman" panose="02020603050405020304" pitchFamily="18" charset="0"/>
+                            <a:cs typeface="Times New Roman" panose="02020603050405020304" pitchFamily="18" charset="0"/>
+                          </a:endParaRPr>
+                        </a:p>
+                      </a:txBody>
+                      <a:tcPr marL="82940" marR="82940" marT="41470" marB="41470"/>
+                    </a:tc>
+                    <a:extLst>
+                      <a:ext uri="{0D108BD9-81ED-4DB2-BD59-A6C34878D82A}">
+                        <a16:rowId xmlns:a16="http://schemas.microsoft.com/office/drawing/2014/main" val="2632569706"/>
+                      </a:ext>
+                    </a:extLst>
+                  </a:tr>
+                </a:tbl>
+              </a:graphicData>
+            </a:graphic>
+          </p:graphicFrame>
+        </mc:Fallback>
+      </mc:AlternateContent>
+      <p:sp>
+        <p:nvSpPr>
+          <p:cNvPr id="40" name="Text Placeholder 31">
+            <a:extLst>
+              <a:ext uri="{FF2B5EF4-FFF2-40B4-BE49-F238E27FC236}">
+                <a16:creationId xmlns:a16="http://schemas.microsoft.com/office/drawing/2014/main" id="{EBCB98E6-0C71-430C-BA13-E59C3922E739}"/>
+              </a:ext>
+            </a:extLst>
+          </p:cNvPr>
+          <p:cNvSpPr txBox="1">
+            <a:spLocks/>
+          </p:cNvSpPr>
+          <p:nvPr/>
+        </p:nvSpPr>
+        <p:spPr>
+          <a:xfrm>
+            <a:off x="10102850" y="11667809"/>
+            <a:ext cx="9047690" cy="536406"/>
+          </a:xfrm>
+          <a:prstGeom prst="rect">
+            <a:avLst/>
+          </a:prstGeom>
+          <a:solidFill>
+            <a:schemeClr val="bg1">
+              <a:lumMod val="50000"/>
+            </a:schemeClr>
+          </a:solidFill>
+        </p:spPr>
+        <p:txBody>
+          <a:bodyPr wrap="square" lIns="52249" tIns="52249" rIns="52249" bIns="52249" anchor="ctr" anchorCtr="0">
+            <a:spAutoFit/>
+          </a:bodyPr>
+          <a:lstStyle>
+            <a:lvl1pPr marL="0" indent="0" algn="ctr" defTabSz="2675223" rtl="0" eaLnBrk="1" latinLnBrk="0" hangingPunct="1">
+              <a:spcBef>
+                <a:spcPct val="20000"/>
+              </a:spcBef>
+              <a:buFont typeface="Arial" pitchFamily="34" charset="0"/>
+              <a:buNone/>
+              <a:defRPr sz="2240" b="1" u="sng" kern="1200" baseline="0">
+                <a:solidFill>
+                  <a:schemeClr val="accent5">
+                    <a:lumMod val="50000"/>
+                  </a:schemeClr>
+                </a:solidFill>
+                <a:latin typeface="+mn-lt"/>
+                <a:ea typeface="+mn-ea"/>
+                <a:cs typeface="+mn-cs"/>
+              </a:defRPr>
+            </a:lvl1pPr>
+            <a:lvl2pPr marL="2173619" indent="-836007" algn="l" defTabSz="2675223" rtl="0" eaLnBrk="1" latinLnBrk="0" hangingPunct="1">
+              <a:spcBef>
+                <a:spcPct val="20000"/>
+              </a:spcBef>
+              <a:buFont typeface="Arial" pitchFamily="34" charset="0"/>
+              <a:buChar char="–"/>
+              <a:defRPr sz="8214" kern="1200">
+                <a:solidFill>
+                  <a:schemeClr val="tx1"/>
+                </a:solidFill>
+                <a:latin typeface="+mn-lt"/>
+                <a:ea typeface="+mn-ea"/>
+                <a:cs typeface="+mn-cs"/>
+              </a:defRPr>
+            </a:lvl2pPr>
+            <a:lvl3pPr marL="3344029" indent="-668806" algn="l" defTabSz="2675223" rtl="0" eaLnBrk="1" latinLnBrk="0" hangingPunct="1">
+              <a:spcBef>
+                <a:spcPct val="20000"/>
+              </a:spcBef>
+              <a:buFont typeface="Arial" pitchFamily="34" charset="0"/>
+              <a:buChar char="•"/>
+              <a:defRPr sz="7040" kern="1200">
+                <a:solidFill>
+                  <a:schemeClr val="tx1"/>
+                </a:solidFill>
+                <a:latin typeface="+mn-lt"/>
+                <a:ea typeface="+mn-ea"/>
+                <a:cs typeface="+mn-cs"/>
+              </a:defRPr>
+            </a:lvl3pPr>
+            <a:lvl4pPr marL="4681641" indent="-668806" algn="l" defTabSz="2675223" rtl="0" eaLnBrk="1" latinLnBrk="0" hangingPunct="1">
+              <a:spcBef>
+                <a:spcPct val="20000"/>
+              </a:spcBef>
+              <a:buFont typeface="Arial" pitchFamily="34" charset="0"/>
+              <a:buChar char="–"/>
+              <a:defRPr sz="5867" kern="1200">
+                <a:solidFill>
+                  <a:schemeClr val="tx1"/>
+                </a:solidFill>
+                <a:latin typeface="+mn-lt"/>
+                <a:ea typeface="+mn-ea"/>
+                <a:cs typeface="+mn-cs"/>
+              </a:defRPr>
+            </a:lvl4pPr>
+            <a:lvl5pPr marL="6019252" indent="-668806" algn="l" defTabSz="2675223" rtl="0" eaLnBrk="1" latinLnBrk="0" hangingPunct="1">
+              <a:spcBef>
+                <a:spcPct val="20000"/>
+              </a:spcBef>
+              <a:buFont typeface="Arial" pitchFamily="34" charset="0"/>
+              <a:buChar char="»"/>
+              <a:defRPr sz="5867" kern="1200">
+                <a:solidFill>
+                  <a:schemeClr val="tx1"/>
+                </a:solidFill>
+                <a:latin typeface="+mn-lt"/>
+                <a:ea typeface="+mn-ea"/>
+                <a:cs typeface="+mn-cs"/>
+              </a:defRPr>
+            </a:lvl5pPr>
+            <a:lvl6pPr marL="7356863" indent="-668806" algn="l" defTabSz="2675223" rtl="0" eaLnBrk="1" latinLnBrk="0" hangingPunct="1">
+              <a:spcBef>
+                <a:spcPct val="20000"/>
+              </a:spcBef>
+              <a:buFont typeface="Arial" pitchFamily="34" charset="0"/>
+              <a:buChar char="•"/>
+              <a:defRPr sz="5867" kern="1200">
+                <a:solidFill>
+                  <a:schemeClr val="tx1"/>
+                </a:solidFill>
+                <a:latin typeface="+mn-lt"/>
+                <a:ea typeface="+mn-ea"/>
+                <a:cs typeface="+mn-cs"/>
+              </a:defRPr>
+            </a:lvl6pPr>
+            <a:lvl7pPr marL="8694474" indent="-668806" algn="l" defTabSz="2675223" rtl="0" eaLnBrk="1" latinLnBrk="0" hangingPunct="1">
+              <a:spcBef>
+                <a:spcPct val="20000"/>
+              </a:spcBef>
+              <a:buFont typeface="Arial" pitchFamily="34" charset="0"/>
+              <a:buChar char="•"/>
+              <a:defRPr sz="5867" kern="1200">
+                <a:solidFill>
+                  <a:schemeClr val="tx1"/>
+                </a:solidFill>
+                <a:latin typeface="+mn-lt"/>
+                <a:ea typeface="+mn-ea"/>
+                <a:cs typeface="+mn-cs"/>
+              </a:defRPr>
+            </a:lvl7pPr>
+            <a:lvl8pPr marL="10032086" indent="-668806" algn="l" defTabSz="2675223" rtl="0" eaLnBrk="1" latinLnBrk="0" hangingPunct="1">
+              <a:spcBef>
+                <a:spcPct val="20000"/>
+              </a:spcBef>
+              <a:buFont typeface="Arial" pitchFamily="34" charset="0"/>
+              <a:buChar char="•"/>
+              <a:defRPr sz="5867" kern="1200">
+                <a:solidFill>
+                  <a:schemeClr val="tx1"/>
+                </a:solidFill>
+                <a:latin typeface="+mn-lt"/>
+                <a:ea typeface="+mn-ea"/>
+                <a:cs typeface="+mn-cs"/>
+              </a:defRPr>
+            </a:lvl8pPr>
+            <a:lvl9pPr marL="11369697" indent="-668806" algn="l" defTabSz="2675223" rtl="0" eaLnBrk="1" latinLnBrk="0" hangingPunct="1">
+              <a:spcBef>
+                <a:spcPct val="20000"/>
+              </a:spcBef>
+              <a:buFont typeface="Arial" pitchFamily="34" charset="0"/>
+              <a:buChar char="•"/>
+              <a:defRPr sz="5867" kern="1200">
+                <a:solidFill>
+                  <a:schemeClr val="tx1"/>
+                </a:solidFill>
+                <a:latin typeface="+mn-lt"/>
+                <a:ea typeface="+mn-ea"/>
+                <a:cs typeface="+mn-cs"/>
+              </a:defRPr>
+            </a:lvl9pPr>
+          </a:lstStyle>
+          <a:p>
+            <a:r>
+              <a:rPr lang="en-US" sz="2800" u="none" dirty="0">
+                <a:solidFill>
+                  <a:schemeClr val="bg1"/>
+                </a:solidFill>
+              </a:rPr>
+              <a:t>Experiment 2: Stochastic Block Model generated</a:t>
+            </a:r>
+          </a:p>
+        </p:txBody>
+      </p:sp>
+      <p:sp>
+        <p:nvSpPr>
+          <p:cNvPr id="41" name="Text Placeholder 30">
+            <a:extLst>
+              <a:ext uri="{FF2B5EF4-FFF2-40B4-BE49-F238E27FC236}">
+                <a16:creationId xmlns:a16="http://schemas.microsoft.com/office/drawing/2014/main" id="{A1C173C2-D0B6-4FDC-8E08-143DEE2910AF}"/>
+              </a:ext>
+            </a:extLst>
+          </p:cNvPr>
+          <p:cNvSpPr txBox="1">
+            <a:spLocks/>
+          </p:cNvSpPr>
+          <p:nvPr/>
+        </p:nvSpPr>
+        <p:spPr>
+          <a:xfrm>
+            <a:off x="10152908" y="12211723"/>
+            <a:ext cx="9047690" cy="633127"/>
+          </a:xfrm>
+          <a:prstGeom prst="rect">
+            <a:avLst/>
+          </a:prstGeom>
+        </p:spPr>
+        <p:txBody>
+          <a:bodyPr wrap="square" lIns="130622" tIns="130622" rIns="130622" bIns="130622">
+            <a:spAutoFit/>
+          </a:bodyPr>
+          <a:lstStyle>
+            <a:lvl1pPr marL="0" indent="0" algn="l" defTabSz="2675223" rtl="0" eaLnBrk="1" latinLnBrk="0" hangingPunct="1">
+              <a:spcBef>
+                <a:spcPct val="20000"/>
+              </a:spcBef>
+              <a:buFont typeface="Arial" pitchFamily="34" charset="0"/>
+              <a:buNone/>
+              <a:defRPr sz="1493" kern="1200">
+                <a:solidFill>
+                  <a:schemeClr val="accent5">
+                    <a:lumMod val="50000"/>
+                  </a:schemeClr>
+                </a:solidFill>
+                <a:latin typeface="Times New Roman" panose="02020603050405020304" pitchFamily="18" charset="0"/>
+                <a:ea typeface="+mn-ea"/>
+                <a:cs typeface="Times New Roman" panose="02020603050405020304" pitchFamily="18" charset="0"/>
+              </a:defRPr>
+            </a:lvl1pPr>
+            <a:lvl2pPr marL="905674" indent="-348336" algn="l" defTabSz="2675223" rtl="0" eaLnBrk="1" latinLnBrk="0" hangingPunct="1">
+              <a:spcBef>
+                <a:spcPct val="20000"/>
+              </a:spcBef>
+              <a:buFont typeface="Arial" pitchFamily="34" charset="0"/>
+              <a:buChar char="–"/>
+              <a:defRPr sz="1493" kern="1200">
+                <a:solidFill>
+                  <a:schemeClr val="tx1"/>
+                </a:solidFill>
+                <a:latin typeface="Trebuchet MS" pitchFamily="34" charset="0"/>
+                <a:ea typeface="+mn-ea"/>
+                <a:cs typeface="+mn-cs"/>
+              </a:defRPr>
+            </a:lvl2pPr>
+            <a:lvl3pPr marL="1254010" indent="-348336" algn="l" defTabSz="2675223" rtl="0" eaLnBrk="1" latinLnBrk="0" hangingPunct="1">
+              <a:spcBef>
+                <a:spcPct val="20000"/>
+              </a:spcBef>
+              <a:buFont typeface="Arial" pitchFamily="34" charset="0"/>
+              <a:buChar char="•"/>
+              <a:defRPr sz="1493" kern="1200">
+                <a:solidFill>
+                  <a:schemeClr val="tx1"/>
+                </a:solidFill>
+                <a:latin typeface="Trebuchet MS" pitchFamily="34" charset="0"/>
+                <a:ea typeface="+mn-ea"/>
+                <a:cs typeface="+mn-cs"/>
+              </a:defRPr>
+            </a:lvl3pPr>
+            <a:lvl4pPr marL="1637181" indent="-383170" algn="l" defTabSz="2675223" rtl="0" eaLnBrk="1" latinLnBrk="0" hangingPunct="1">
+              <a:spcBef>
+                <a:spcPct val="20000"/>
+              </a:spcBef>
+              <a:buFont typeface="Arial" pitchFamily="34" charset="0"/>
+              <a:buChar char="–"/>
+              <a:defRPr sz="1493" kern="1200">
+                <a:solidFill>
+                  <a:schemeClr val="tx1"/>
+                </a:solidFill>
+                <a:latin typeface="Trebuchet MS" pitchFamily="34" charset="0"/>
+                <a:ea typeface="+mn-ea"/>
+                <a:cs typeface="+mn-cs"/>
+              </a:defRPr>
+            </a:lvl4pPr>
+            <a:lvl5pPr marL="1915850" indent="-278669" algn="l" defTabSz="2675223" rtl="0" eaLnBrk="1" latinLnBrk="0" hangingPunct="1">
+              <a:spcBef>
+                <a:spcPct val="20000"/>
+              </a:spcBef>
+              <a:buFont typeface="Arial" pitchFamily="34" charset="0"/>
+              <a:buChar char="»"/>
+              <a:defRPr sz="1493" kern="1200">
+                <a:solidFill>
+                  <a:schemeClr val="tx1"/>
+                </a:solidFill>
+                <a:latin typeface="Trebuchet MS" pitchFamily="34" charset="0"/>
+                <a:ea typeface="+mn-ea"/>
+                <a:cs typeface="+mn-cs"/>
+              </a:defRPr>
+            </a:lvl5pPr>
+            <a:lvl6pPr marL="7356863" indent="-668806" algn="l" defTabSz="2675223" rtl="0" eaLnBrk="1" latinLnBrk="0" hangingPunct="1">
+              <a:spcBef>
+                <a:spcPct val="20000"/>
+              </a:spcBef>
+              <a:buFont typeface="Arial" pitchFamily="34" charset="0"/>
+              <a:buChar char="•"/>
+              <a:defRPr sz="5867" kern="1200">
+                <a:solidFill>
+                  <a:schemeClr val="tx1"/>
+                </a:solidFill>
+                <a:latin typeface="+mn-lt"/>
+                <a:ea typeface="+mn-ea"/>
+                <a:cs typeface="+mn-cs"/>
+              </a:defRPr>
+            </a:lvl6pPr>
+            <a:lvl7pPr marL="8694474" indent="-668806" algn="l" defTabSz="2675223" rtl="0" eaLnBrk="1" latinLnBrk="0" hangingPunct="1">
+              <a:spcBef>
+                <a:spcPct val="20000"/>
+              </a:spcBef>
+              <a:buFont typeface="Arial" pitchFamily="34" charset="0"/>
+              <a:buChar char="•"/>
+              <a:defRPr sz="5867" kern="1200">
+                <a:solidFill>
+                  <a:schemeClr val="tx1"/>
+                </a:solidFill>
+                <a:latin typeface="+mn-lt"/>
+                <a:ea typeface="+mn-ea"/>
+                <a:cs typeface="+mn-cs"/>
+              </a:defRPr>
+            </a:lvl7pPr>
+            <a:lvl8pPr marL="10032086" indent="-668806" algn="l" defTabSz="2675223" rtl="0" eaLnBrk="1" latinLnBrk="0" hangingPunct="1">
+              <a:spcBef>
+                <a:spcPct val="20000"/>
+              </a:spcBef>
+              <a:buFont typeface="Arial" pitchFamily="34" charset="0"/>
+              <a:buChar char="•"/>
+              <a:defRPr sz="5867" kern="1200">
+                <a:solidFill>
+                  <a:schemeClr val="tx1"/>
+                </a:solidFill>
+                <a:latin typeface="+mn-lt"/>
+                <a:ea typeface="+mn-ea"/>
+                <a:cs typeface="+mn-cs"/>
+              </a:defRPr>
+            </a:lvl8pPr>
+            <a:lvl9pPr marL="11369697" indent="-668806" algn="l" defTabSz="2675223" rtl="0" eaLnBrk="1" latinLnBrk="0" hangingPunct="1">
+              <a:spcBef>
+                <a:spcPct val="20000"/>
+              </a:spcBef>
+              <a:buFont typeface="Arial" pitchFamily="34" charset="0"/>
+              <a:buChar char="•"/>
+              <a:defRPr sz="5867" kern="1200">
+                <a:solidFill>
+                  <a:schemeClr val="tx1"/>
+                </a:solidFill>
+                <a:latin typeface="+mn-lt"/>
+                <a:ea typeface="+mn-ea"/>
+                <a:cs typeface="+mn-cs"/>
+              </a:defRPr>
+            </a:lvl9pPr>
+          </a:lstStyle>
+          <a:p>
+            <a:pPr marL="342900" indent="-342900">
+              <a:buFont typeface="Arial" pitchFamily="34" charset="0"/>
+              <a:buChar char="•"/>
+            </a:pPr>
+            <a:r>
+              <a:rPr lang="en-US" sz="2400" dirty="0"/>
+              <a:t>SBM: 2 groups of 20 nodes, edges determined stochastically</a:t>
+            </a:r>
+          </a:p>
+        </p:txBody>
+      </p:sp>
+      <p:grpSp>
+        <p:nvGrpSpPr>
+          <p:cNvPr id="16" name="Groep 15">
+            <a:extLst>
+              <a:ext uri="{FF2B5EF4-FFF2-40B4-BE49-F238E27FC236}">
+                <a16:creationId xmlns:a16="http://schemas.microsoft.com/office/drawing/2014/main" id="{011139D0-8ACA-482C-9668-2EF2F8EB9EF2}"/>
+              </a:ext>
+            </a:extLst>
+          </p:cNvPr>
+          <p:cNvGrpSpPr/>
+          <p:nvPr/>
+        </p:nvGrpSpPr>
+        <p:grpSpPr>
+          <a:xfrm>
+            <a:off x="10149840" y="12893504"/>
+            <a:ext cx="8961120" cy="3048000"/>
+            <a:chOff x="10149840" y="12893504"/>
+            <a:chExt cx="8961120" cy="3048000"/>
+          </a:xfrm>
+          <a:solidFill>
+            <a:schemeClr val="bg1">
+              <a:lumMod val="95000"/>
+            </a:schemeClr>
+          </a:solidFill>
+        </p:grpSpPr>
+        <p:pic>
+          <p:nvPicPr>
+            <p:cNvPr id="13" name="Afbeelding 12">
+              <a:extLst>
+                <a:ext uri="{FF2B5EF4-FFF2-40B4-BE49-F238E27FC236}">
+                  <a16:creationId xmlns:a16="http://schemas.microsoft.com/office/drawing/2014/main" id="{E355CC11-67CF-48EC-821C-B2CC9762308B}"/>
+                </a:ext>
+              </a:extLst>
+            </p:cNvPr>
+            <p:cNvPicPr>
+              <a:picLocks noChangeAspect="1"/>
+            </p:cNvPicPr>
+            <p:nvPr/>
+          </p:nvPicPr>
+          <p:blipFill>
+            <a:blip r:embed="rId8">
+              <a:extLst>
+                <a:ext uri="{28A0092B-C50C-407E-A947-70E740481C1C}">
+                  <a14:useLocalDpi xmlns:a14="http://schemas.microsoft.com/office/drawing/2010/main" val="0"/>
+                </a:ext>
+              </a:extLst>
+            </a:blip>
+            <a:stretch>
+              <a:fillRect/>
+            </a:stretch>
+          </p:blipFill>
+          <p:spPr>
+            <a:xfrm>
+              <a:off x="10149840" y="12893504"/>
+              <a:ext cx="4572000" cy="3048000"/>
+            </a:xfrm>
+            <a:prstGeom prst="rect">
+              <a:avLst/>
+            </a:prstGeom>
+            <a:grpFill/>
+          </p:spPr>
+        </p:pic>
+        <p:pic>
+          <p:nvPicPr>
+            <p:cNvPr id="15" name="Afbeelding 14">
+              <a:extLst>
+                <a:ext uri="{FF2B5EF4-FFF2-40B4-BE49-F238E27FC236}">
+                  <a16:creationId xmlns:a16="http://schemas.microsoft.com/office/drawing/2014/main" id="{9D2D6487-B1F0-4603-BB3C-49CB57B5B063}"/>
+                </a:ext>
+              </a:extLst>
+            </p:cNvPr>
+            <p:cNvPicPr>
+              <a:picLocks noChangeAspect="1"/>
+            </p:cNvPicPr>
+            <p:nvPr/>
+          </p:nvPicPr>
+          <p:blipFill>
+            <a:blip r:embed="rId9">
+              <a:extLst>
+                <a:ext uri="{28A0092B-C50C-407E-A947-70E740481C1C}">
+                  <a14:useLocalDpi xmlns:a14="http://schemas.microsoft.com/office/drawing/2010/main" val="0"/>
+                </a:ext>
+              </a:extLst>
+            </a:blip>
+            <a:stretch>
+              <a:fillRect/>
+            </a:stretch>
+          </p:blipFill>
+          <p:spPr>
+            <a:xfrm>
+              <a:off x="14538960" y="12893504"/>
+              <a:ext cx="4572000" cy="3048000"/>
+            </a:xfrm>
+            <a:prstGeom prst="rect">
+              <a:avLst/>
+            </a:prstGeom>
+            <a:grpFill/>
+          </p:spPr>
+        </p:pic>
+      </p:grpSp>
+      <p:sp>
+        <p:nvSpPr>
+          <p:cNvPr id="46" name="Text Placeholder 31">
+            <a:extLst>
+              <a:ext uri="{FF2B5EF4-FFF2-40B4-BE49-F238E27FC236}">
+                <a16:creationId xmlns:a16="http://schemas.microsoft.com/office/drawing/2014/main" id="{6A4D5696-BA7D-427B-9258-76E737AA8ED3}"/>
+              </a:ext>
+            </a:extLst>
+          </p:cNvPr>
+          <p:cNvSpPr txBox="1">
+            <a:spLocks/>
+          </p:cNvSpPr>
+          <p:nvPr/>
+        </p:nvSpPr>
+        <p:spPr>
+          <a:xfrm>
+            <a:off x="19587173" y="8381037"/>
+            <a:ext cx="9047690" cy="536406"/>
+          </a:xfrm>
+          <a:prstGeom prst="rect">
+            <a:avLst/>
+          </a:prstGeom>
+          <a:solidFill>
+            <a:schemeClr val="bg1">
+              <a:lumMod val="50000"/>
+            </a:schemeClr>
+          </a:solidFill>
+        </p:spPr>
+        <p:txBody>
+          <a:bodyPr wrap="square" lIns="52249" tIns="52249" rIns="52249" bIns="52249" anchor="ctr" anchorCtr="0">
+            <a:spAutoFit/>
+          </a:bodyPr>
+          <a:lstStyle>
+            <a:lvl1pPr marL="0" indent="0" algn="ctr" defTabSz="2675223" rtl="0" eaLnBrk="1" latinLnBrk="0" hangingPunct="1">
+              <a:spcBef>
+                <a:spcPct val="20000"/>
+              </a:spcBef>
+              <a:buFont typeface="Arial" pitchFamily="34" charset="0"/>
+              <a:buNone/>
+              <a:defRPr sz="2240" b="1" u="sng" kern="1200" baseline="0">
+                <a:solidFill>
+                  <a:schemeClr val="accent5">
+                    <a:lumMod val="50000"/>
+                  </a:schemeClr>
+                </a:solidFill>
+                <a:latin typeface="+mn-lt"/>
+                <a:ea typeface="+mn-ea"/>
+                <a:cs typeface="+mn-cs"/>
+              </a:defRPr>
+            </a:lvl1pPr>
+            <a:lvl2pPr marL="2173619" indent="-836007" algn="l" defTabSz="2675223" rtl="0" eaLnBrk="1" latinLnBrk="0" hangingPunct="1">
+              <a:spcBef>
+                <a:spcPct val="20000"/>
+              </a:spcBef>
+              <a:buFont typeface="Arial" pitchFamily="34" charset="0"/>
+              <a:buChar char="–"/>
+              <a:defRPr sz="8214" kern="1200">
+                <a:solidFill>
+                  <a:schemeClr val="tx1"/>
+                </a:solidFill>
+                <a:latin typeface="+mn-lt"/>
+                <a:ea typeface="+mn-ea"/>
+                <a:cs typeface="+mn-cs"/>
+              </a:defRPr>
+            </a:lvl2pPr>
+            <a:lvl3pPr marL="3344029" indent="-668806" algn="l" defTabSz="2675223" rtl="0" eaLnBrk="1" latinLnBrk="0" hangingPunct="1">
+              <a:spcBef>
+                <a:spcPct val="20000"/>
+              </a:spcBef>
+              <a:buFont typeface="Arial" pitchFamily="34" charset="0"/>
+              <a:buChar char="•"/>
+              <a:defRPr sz="7040" kern="1200">
+                <a:solidFill>
+                  <a:schemeClr val="tx1"/>
+                </a:solidFill>
+                <a:latin typeface="+mn-lt"/>
+                <a:ea typeface="+mn-ea"/>
+                <a:cs typeface="+mn-cs"/>
+              </a:defRPr>
+            </a:lvl3pPr>
+            <a:lvl4pPr marL="4681641" indent="-668806" algn="l" defTabSz="2675223" rtl="0" eaLnBrk="1" latinLnBrk="0" hangingPunct="1">
+              <a:spcBef>
+                <a:spcPct val="20000"/>
+              </a:spcBef>
+              <a:buFont typeface="Arial" pitchFamily="34" charset="0"/>
+              <a:buChar char="–"/>
+              <a:defRPr sz="5867" kern="1200">
+                <a:solidFill>
+                  <a:schemeClr val="tx1"/>
+                </a:solidFill>
+                <a:latin typeface="+mn-lt"/>
+                <a:ea typeface="+mn-ea"/>
+                <a:cs typeface="+mn-cs"/>
+              </a:defRPr>
+            </a:lvl4pPr>
+            <a:lvl5pPr marL="6019252" indent="-668806" algn="l" defTabSz="2675223" rtl="0" eaLnBrk="1" latinLnBrk="0" hangingPunct="1">
+              <a:spcBef>
+                <a:spcPct val="20000"/>
+              </a:spcBef>
+              <a:buFont typeface="Arial" pitchFamily="34" charset="0"/>
+              <a:buChar char="»"/>
+              <a:defRPr sz="5867" kern="1200">
+                <a:solidFill>
+                  <a:schemeClr val="tx1"/>
+                </a:solidFill>
+                <a:latin typeface="+mn-lt"/>
+                <a:ea typeface="+mn-ea"/>
+                <a:cs typeface="+mn-cs"/>
+              </a:defRPr>
+            </a:lvl5pPr>
+            <a:lvl6pPr marL="7356863" indent="-668806" algn="l" defTabSz="2675223" rtl="0" eaLnBrk="1" latinLnBrk="0" hangingPunct="1">
+              <a:spcBef>
+                <a:spcPct val="20000"/>
+              </a:spcBef>
+              <a:buFont typeface="Arial" pitchFamily="34" charset="0"/>
+              <a:buChar char="•"/>
+              <a:defRPr sz="5867" kern="1200">
+                <a:solidFill>
+                  <a:schemeClr val="tx1"/>
+                </a:solidFill>
+                <a:latin typeface="+mn-lt"/>
+                <a:ea typeface="+mn-ea"/>
+                <a:cs typeface="+mn-cs"/>
+              </a:defRPr>
+            </a:lvl6pPr>
+            <a:lvl7pPr marL="8694474" indent="-668806" algn="l" defTabSz="2675223" rtl="0" eaLnBrk="1" latinLnBrk="0" hangingPunct="1">
+              <a:spcBef>
+                <a:spcPct val="20000"/>
+              </a:spcBef>
+              <a:buFont typeface="Arial" pitchFamily="34" charset="0"/>
+              <a:buChar char="•"/>
+              <a:defRPr sz="5867" kern="1200">
+                <a:solidFill>
+                  <a:schemeClr val="tx1"/>
+                </a:solidFill>
+                <a:latin typeface="+mn-lt"/>
+                <a:ea typeface="+mn-ea"/>
+                <a:cs typeface="+mn-cs"/>
+              </a:defRPr>
+            </a:lvl7pPr>
+            <a:lvl8pPr marL="10032086" indent="-668806" algn="l" defTabSz="2675223" rtl="0" eaLnBrk="1" latinLnBrk="0" hangingPunct="1">
+              <a:spcBef>
+                <a:spcPct val="20000"/>
+              </a:spcBef>
+              <a:buFont typeface="Arial" pitchFamily="34" charset="0"/>
+              <a:buChar char="•"/>
+              <a:defRPr sz="5867" kern="1200">
+                <a:solidFill>
+                  <a:schemeClr val="tx1"/>
+                </a:solidFill>
+                <a:latin typeface="+mn-lt"/>
+                <a:ea typeface="+mn-ea"/>
+                <a:cs typeface="+mn-cs"/>
+              </a:defRPr>
+            </a:lvl8pPr>
+            <a:lvl9pPr marL="11369697" indent="-668806" algn="l" defTabSz="2675223" rtl="0" eaLnBrk="1" latinLnBrk="0" hangingPunct="1">
+              <a:spcBef>
+                <a:spcPct val="20000"/>
+              </a:spcBef>
+              <a:buFont typeface="Arial" pitchFamily="34" charset="0"/>
+              <a:buChar char="•"/>
+              <a:defRPr sz="5867" kern="1200">
+                <a:solidFill>
+                  <a:schemeClr val="tx1"/>
+                </a:solidFill>
+                <a:latin typeface="+mn-lt"/>
+                <a:ea typeface="+mn-ea"/>
+                <a:cs typeface="+mn-cs"/>
+              </a:defRPr>
+            </a:lvl9pPr>
+          </a:lstStyle>
+          <a:p>
+            <a:r>
+              <a:rPr lang="en-US" sz="2800" u="none" dirty="0">
+                <a:solidFill>
+                  <a:schemeClr val="bg1"/>
+                </a:solidFill>
+              </a:rPr>
+              <a:t>Regularized Twitter dataset</a:t>
+            </a:r>
+          </a:p>
+        </p:txBody>
+      </p:sp>
+      <p:sp>
+        <p:nvSpPr>
+          <p:cNvPr id="48" name="Text Placeholder 31">
+            <a:extLst>
+              <a:ext uri="{FF2B5EF4-FFF2-40B4-BE49-F238E27FC236}">
+                <a16:creationId xmlns:a16="http://schemas.microsoft.com/office/drawing/2014/main" id="{6439E209-9B69-4987-A325-FCA8A4C84BD0}"/>
+              </a:ext>
+            </a:extLst>
+          </p:cNvPr>
+          <p:cNvSpPr txBox="1">
+            <a:spLocks/>
+          </p:cNvSpPr>
+          <p:nvPr/>
+        </p:nvSpPr>
+        <p:spPr>
+          <a:xfrm>
+            <a:off x="19571717" y="12251559"/>
+            <a:ext cx="9047690" cy="536406"/>
+          </a:xfrm>
+          <a:prstGeom prst="rect">
+            <a:avLst/>
+          </a:prstGeom>
+          <a:solidFill>
+            <a:schemeClr val="bg1">
+              <a:lumMod val="50000"/>
+            </a:schemeClr>
+          </a:solidFill>
+        </p:spPr>
+        <p:txBody>
+          <a:bodyPr wrap="square" lIns="52249" tIns="52249" rIns="52249" bIns="52249" anchor="ctr" anchorCtr="0">
+            <a:spAutoFit/>
+          </a:bodyPr>
+          <a:lstStyle>
+            <a:lvl1pPr marL="0" indent="0" algn="ctr" defTabSz="2675223" rtl="0" eaLnBrk="1" latinLnBrk="0" hangingPunct="1">
+              <a:spcBef>
+                <a:spcPct val="20000"/>
+              </a:spcBef>
+              <a:buFont typeface="Arial" pitchFamily="34" charset="0"/>
+              <a:buNone/>
+              <a:defRPr sz="2240" b="1" u="sng" kern="1200" baseline="0">
+                <a:solidFill>
+                  <a:schemeClr val="accent5">
+                    <a:lumMod val="50000"/>
+                  </a:schemeClr>
+                </a:solidFill>
+                <a:latin typeface="+mn-lt"/>
+                <a:ea typeface="+mn-ea"/>
+                <a:cs typeface="+mn-cs"/>
+              </a:defRPr>
+            </a:lvl1pPr>
+            <a:lvl2pPr marL="2173619" indent="-836007" algn="l" defTabSz="2675223" rtl="0" eaLnBrk="1" latinLnBrk="0" hangingPunct="1">
+              <a:spcBef>
+                <a:spcPct val="20000"/>
+              </a:spcBef>
+              <a:buFont typeface="Arial" pitchFamily="34" charset="0"/>
+              <a:buChar char="–"/>
+              <a:defRPr sz="8214" kern="1200">
+                <a:solidFill>
+                  <a:schemeClr val="tx1"/>
+                </a:solidFill>
+                <a:latin typeface="+mn-lt"/>
+                <a:ea typeface="+mn-ea"/>
+                <a:cs typeface="+mn-cs"/>
+              </a:defRPr>
+            </a:lvl2pPr>
+            <a:lvl3pPr marL="3344029" indent="-668806" algn="l" defTabSz="2675223" rtl="0" eaLnBrk="1" latinLnBrk="0" hangingPunct="1">
+              <a:spcBef>
+                <a:spcPct val="20000"/>
+              </a:spcBef>
+              <a:buFont typeface="Arial" pitchFamily="34" charset="0"/>
+              <a:buChar char="•"/>
+              <a:defRPr sz="7040" kern="1200">
+                <a:solidFill>
+                  <a:schemeClr val="tx1"/>
+                </a:solidFill>
+                <a:latin typeface="+mn-lt"/>
+                <a:ea typeface="+mn-ea"/>
+                <a:cs typeface="+mn-cs"/>
+              </a:defRPr>
+            </a:lvl3pPr>
+            <a:lvl4pPr marL="4681641" indent="-668806" algn="l" defTabSz="2675223" rtl="0" eaLnBrk="1" latinLnBrk="0" hangingPunct="1">
+              <a:spcBef>
+                <a:spcPct val="20000"/>
+              </a:spcBef>
+              <a:buFont typeface="Arial" pitchFamily="34" charset="0"/>
+              <a:buChar char="–"/>
+              <a:defRPr sz="5867" kern="1200">
+                <a:solidFill>
+                  <a:schemeClr val="tx1"/>
+                </a:solidFill>
+                <a:latin typeface="+mn-lt"/>
+                <a:ea typeface="+mn-ea"/>
+                <a:cs typeface="+mn-cs"/>
+              </a:defRPr>
+            </a:lvl4pPr>
+            <a:lvl5pPr marL="6019252" indent="-668806" algn="l" defTabSz="2675223" rtl="0" eaLnBrk="1" latinLnBrk="0" hangingPunct="1">
+              <a:spcBef>
+                <a:spcPct val="20000"/>
+              </a:spcBef>
+              <a:buFont typeface="Arial" pitchFamily="34" charset="0"/>
+              <a:buChar char="»"/>
+              <a:defRPr sz="5867" kern="1200">
+                <a:solidFill>
+                  <a:schemeClr val="tx1"/>
+                </a:solidFill>
+                <a:latin typeface="+mn-lt"/>
+                <a:ea typeface="+mn-ea"/>
+                <a:cs typeface="+mn-cs"/>
+              </a:defRPr>
+            </a:lvl5pPr>
+            <a:lvl6pPr marL="7356863" indent="-668806" algn="l" defTabSz="2675223" rtl="0" eaLnBrk="1" latinLnBrk="0" hangingPunct="1">
+              <a:spcBef>
+                <a:spcPct val="20000"/>
+              </a:spcBef>
+              <a:buFont typeface="Arial" pitchFamily="34" charset="0"/>
+              <a:buChar char="•"/>
+              <a:defRPr sz="5867" kern="1200">
+                <a:solidFill>
+                  <a:schemeClr val="tx1"/>
+                </a:solidFill>
+                <a:latin typeface="+mn-lt"/>
+                <a:ea typeface="+mn-ea"/>
+                <a:cs typeface="+mn-cs"/>
+              </a:defRPr>
+            </a:lvl6pPr>
+            <a:lvl7pPr marL="8694474" indent="-668806" algn="l" defTabSz="2675223" rtl="0" eaLnBrk="1" latinLnBrk="0" hangingPunct="1">
+              <a:spcBef>
+                <a:spcPct val="20000"/>
+              </a:spcBef>
+              <a:buFont typeface="Arial" pitchFamily="34" charset="0"/>
+              <a:buChar char="•"/>
+              <a:defRPr sz="5867" kern="1200">
+                <a:solidFill>
+                  <a:schemeClr val="tx1"/>
+                </a:solidFill>
+                <a:latin typeface="+mn-lt"/>
+                <a:ea typeface="+mn-ea"/>
+                <a:cs typeface="+mn-cs"/>
+              </a:defRPr>
+            </a:lvl7pPr>
+            <a:lvl8pPr marL="10032086" indent="-668806" algn="l" defTabSz="2675223" rtl="0" eaLnBrk="1" latinLnBrk="0" hangingPunct="1">
+              <a:spcBef>
+                <a:spcPct val="20000"/>
+              </a:spcBef>
+              <a:buFont typeface="Arial" pitchFamily="34" charset="0"/>
+              <a:buChar char="•"/>
+              <a:defRPr sz="5867" kern="1200">
+                <a:solidFill>
+                  <a:schemeClr val="tx1"/>
+                </a:solidFill>
+                <a:latin typeface="+mn-lt"/>
+                <a:ea typeface="+mn-ea"/>
+                <a:cs typeface="+mn-cs"/>
+              </a:defRPr>
+            </a:lvl8pPr>
+            <a:lvl9pPr marL="11369697" indent="-668806" algn="l" defTabSz="2675223" rtl="0" eaLnBrk="1" latinLnBrk="0" hangingPunct="1">
+              <a:spcBef>
+                <a:spcPct val="20000"/>
+              </a:spcBef>
+              <a:buFont typeface="Arial" pitchFamily="34" charset="0"/>
+              <a:buChar char="•"/>
+              <a:defRPr sz="5867" kern="1200">
+                <a:solidFill>
+                  <a:schemeClr val="tx1"/>
+                </a:solidFill>
+                <a:latin typeface="+mn-lt"/>
+                <a:ea typeface="+mn-ea"/>
+                <a:cs typeface="+mn-cs"/>
+              </a:defRPr>
+            </a:lvl9pPr>
+          </a:lstStyle>
+          <a:p>
+            <a:r>
+              <a:rPr lang="en-US" sz="2800" u="none" dirty="0">
+                <a:solidFill>
+                  <a:schemeClr val="bg1"/>
+                </a:solidFill>
+              </a:rPr>
+              <a:t>Regularized SBM dataset</a:t>
+            </a:r>
+          </a:p>
+        </p:txBody>
+      </p:sp>
+      <p:grpSp>
+        <p:nvGrpSpPr>
+          <p:cNvPr id="23" name="Groep 22">
+            <a:extLst>
+              <a:ext uri="{FF2B5EF4-FFF2-40B4-BE49-F238E27FC236}">
+                <a16:creationId xmlns:a16="http://schemas.microsoft.com/office/drawing/2014/main" id="{42644E5C-9C21-433E-94B5-E3C247A94C97}"/>
+              </a:ext>
+            </a:extLst>
+          </p:cNvPr>
+          <p:cNvGrpSpPr/>
+          <p:nvPr/>
+        </p:nvGrpSpPr>
+        <p:grpSpPr>
+          <a:xfrm>
+            <a:off x="19602891" y="8957194"/>
+            <a:ext cx="8994496" cy="3048000"/>
+            <a:chOff x="19602891" y="8880994"/>
+            <a:chExt cx="8994496" cy="3048000"/>
+          </a:xfrm>
+        </p:grpSpPr>
+        <p:pic>
+          <p:nvPicPr>
+            <p:cNvPr id="20" name="Afbeelding 19">
+              <a:extLst>
+                <a:ext uri="{FF2B5EF4-FFF2-40B4-BE49-F238E27FC236}">
+                  <a16:creationId xmlns:a16="http://schemas.microsoft.com/office/drawing/2014/main" id="{2D404661-F034-4421-97A0-0E04CDB45BF8}"/>
+                </a:ext>
+              </a:extLst>
+            </p:cNvPr>
+            <p:cNvPicPr>
+              <a:picLocks noChangeAspect="1"/>
+            </p:cNvPicPr>
+            <p:nvPr/>
+          </p:nvPicPr>
+          <p:blipFill>
+            <a:blip r:embed="rId10">
+              <a:extLst>
+                <a:ext uri="{28A0092B-C50C-407E-A947-70E740481C1C}">
+                  <a14:useLocalDpi xmlns:a14="http://schemas.microsoft.com/office/drawing/2010/main" val="0"/>
+                </a:ext>
+              </a:extLst>
+            </a:blip>
+            <a:stretch>
+              <a:fillRect/>
+            </a:stretch>
+          </p:blipFill>
+          <p:spPr>
+            <a:xfrm>
+              <a:off x="19602891" y="8880994"/>
+              <a:ext cx="4572000" cy="3048000"/>
+            </a:xfrm>
+            <a:prstGeom prst="rect">
+              <a:avLst/>
+            </a:prstGeom>
+            <a:solidFill>
+              <a:schemeClr val="bg1">
+                <a:lumMod val="95000"/>
+              </a:schemeClr>
+            </a:solidFill>
+          </p:spPr>
+        </p:pic>
+        <p:pic>
+          <p:nvPicPr>
+            <p:cNvPr id="22" name="Afbeelding 21">
+              <a:extLst>
+                <a:ext uri="{FF2B5EF4-FFF2-40B4-BE49-F238E27FC236}">
+                  <a16:creationId xmlns:a16="http://schemas.microsoft.com/office/drawing/2014/main" id="{BBB2CD28-F29E-47B4-81A8-BC5320F5B140}"/>
+                </a:ext>
+              </a:extLst>
+            </p:cNvPr>
+            <p:cNvPicPr>
+              <a:picLocks noChangeAspect="1"/>
+            </p:cNvPicPr>
+            <p:nvPr/>
+          </p:nvPicPr>
+          <p:blipFill>
+            <a:blip r:embed="rId11">
+              <a:extLst>
+                <a:ext uri="{28A0092B-C50C-407E-A947-70E740481C1C}">
+                  <a14:useLocalDpi xmlns:a14="http://schemas.microsoft.com/office/drawing/2010/main" val="0"/>
+                </a:ext>
+              </a:extLst>
+            </a:blip>
+            <a:stretch>
+              <a:fillRect/>
+            </a:stretch>
+          </p:blipFill>
+          <p:spPr>
+            <a:xfrm>
+              <a:off x="24025387" y="8880994"/>
+              <a:ext cx="4572000" cy="3048000"/>
+            </a:xfrm>
+            <a:prstGeom prst="rect">
+              <a:avLst/>
+            </a:prstGeom>
+            <a:solidFill>
+              <a:schemeClr val="bg1">
+                <a:lumMod val="95000"/>
+              </a:schemeClr>
+            </a:solidFill>
+          </p:spPr>
+        </p:pic>
+      </p:grpSp>
+      <p:grpSp>
+        <p:nvGrpSpPr>
+          <p:cNvPr id="28" name="Groep 27">
+            <a:extLst>
+              <a:ext uri="{FF2B5EF4-FFF2-40B4-BE49-F238E27FC236}">
+                <a16:creationId xmlns:a16="http://schemas.microsoft.com/office/drawing/2014/main" id="{B9078F5E-F16E-4406-A76E-12BA68D3738F}"/>
+              </a:ext>
+            </a:extLst>
+          </p:cNvPr>
+          <p:cNvGrpSpPr/>
+          <p:nvPr/>
+        </p:nvGrpSpPr>
+        <p:grpSpPr>
+          <a:xfrm>
+            <a:off x="19587210" y="12791614"/>
+            <a:ext cx="9014460" cy="3048000"/>
+            <a:chOff x="19587210" y="12505864"/>
+            <a:chExt cx="9014460" cy="3048000"/>
+          </a:xfrm>
+        </p:grpSpPr>
+        <p:pic>
+          <p:nvPicPr>
+            <p:cNvPr id="25" name="Afbeelding 24">
+              <a:extLst>
+                <a:ext uri="{FF2B5EF4-FFF2-40B4-BE49-F238E27FC236}">
+                  <a16:creationId xmlns:a16="http://schemas.microsoft.com/office/drawing/2014/main" id="{586F3D3A-22BC-48DB-98D9-A1FFCAE05568}"/>
+                </a:ext>
+              </a:extLst>
+            </p:cNvPr>
+            <p:cNvPicPr>
+              <a:picLocks noChangeAspect="1"/>
+            </p:cNvPicPr>
+            <p:nvPr/>
+          </p:nvPicPr>
+          <p:blipFill>
+            <a:blip r:embed="rId12">
+              <a:extLst>
+                <a:ext uri="{28A0092B-C50C-407E-A947-70E740481C1C}">
+                  <a14:useLocalDpi xmlns:a14="http://schemas.microsoft.com/office/drawing/2010/main" val="0"/>
+                </a:ext>
+              </a:extLst>
+            </a:blip>
+            <a:stretch>
+              <a:fillRect/>
+            </a:stretch>
+          </p:blipFill>
+          <p:spPr>
+            <a:xfrm>
+              <a:off x="19587210" y="12505864"/>
+              <a:ext cx="4572000" cy="3048000"/>
+            </a:xfrm>
+            <a:prstGeom prst="rect">
+              <a:avLst/>
+            </a:prstGeom>
+            <a:solidFill>
+              <a:schemeClr val="bg1">
+                <a:lumMod val="95000"/>
+              </a:schemeClr>
+            </a:solidFill>
+          </p:spPr>
+        </p:pic>
+        <p:pic>
+          <p:nvPicPr>
+            <p:cNvPr id="27" name="Afbeelding 26">
+              <a:extLst>
+                <a:ext uri="{FF2B5EF4-FFF2-40B4-BE49-F238E27FC236}">
+                  <a16:creationId xmlns:a16="http://schemas.microsoft.com/office/drawing/2014/main" id="{59358D8F-BEB0-42FC-9115-4F7277949EC8}"/>
+                </a:ext>
+              </a:extLst>
+            </p:cNvPr>
+            <p:cNvPicPr>
+              <a:picLocks noChangeAspect="1"/>
+            </p:cNvPicPr>
+            <p:nvPr/>
+          </p:nvPicPr>
+          <p:blipFill>
+            <a:blip r:embed="rId13">
+              <a:extLst>
+                <a:ext uri="{28A0092B-C50C-407E-A947-70E740481C1C}">
+                  <a14:useLocalDpi xmlns:a14="http://schemas.microsoft.com/office/drawing/2010/main" val="0"/>
+                </a:ext>
+              </a:extLst>
+            </a:blip>
+            <a:stretch>
+              <a:fillRect/>
+            </a:stretch>
+          </p:blipFill>
+          <p:spPr>
+            <a:xfrm>
+              <a:off x="24029670" y="12505864"/>
+              <a:ext cx="4572000" cy="3048000"/>
+            </a:xfrm>
+            <a:prstGeom prst="rect">
+              <a:avLst/>
+            </a:prstGeom>
+            <a:solidFill>
+              <a:schemeClr val="bg1">
+                <a:lumMod val="95000"/>
+              </a:schemeClr>
+            </a:solidFill>
+          </p:spPr>
+        </p:pic>
+      </p:grpSp>
       <p:pic>
         <p:nvPicPr>
-          <p:cNvPr id="49" name="Picture 48" descr="Chart, line chart&#10;&#10;Description automatically generated">
+          <p:cNvPr id="4" name="Afbeelding 3" descr="Afbeelding met tekst, venster&#10;&#10;Automatisch gegenereerde beschrijving">
             <a:extLst>
               <a:ext uri="{FF2B5EF4-FFF2-40B4-BE49-F238E27FC236}">
-                <a16:creationId xmlns:a16="http://schemas.microsoft.com/office/drawing/2014/main" id="{DB63F6F7-8813-49D5-88F0-18E10FF3526C}"/>
+                <a16:creationId xmlns:a16="http://schemas.microsoft.com/office/drawing/2014/main" id="{6DEF9DAE-27CB-40ED-9152-A34D6E98D8F4}"/>
               </a:ext>
             </a:extLst>
           </p:cNvPr>
@@ -18537,7 +21591,7 @@
           <p:nvPr/>
         </p:nvPicPr>
         <p:blipFill>
-          <a:blip r:embed="rId5">
+          <a:blip r:embed="rId14" cstate="print">
             <a:extLst>
               <a:ext uri="{28A0092B-C50C-407E-A947-70E740481C1C}">
                 <a14:useLocalDpi xmlns:a14="http://schemas.microsoft.com/office/drawing/2010/main" val="0"/>
@@ -18550,44 +21604,8 @@
         </p:blipFill>
         <p:spPr>
           <a:xfrm>
-            <a:off x="11023969" y="10618887"/>
-            <a:ext cx="7205451" cy="5122056"/>
-          </a:xfrm>
-          <a:prstGeom prst="rect">
-            <a:avLst/>
-          </a:prstGeom>
-        </p:spPr>
-      </p:pic>
-      <p:pic>
-        <p:nvPicPr>
-          <p:cNvPr id="51" name="Picture 50" descr="Chart, line chart&#10;&#10;Description automatically generated">
-            <a:extLst>
-              <a:ext uri="{FF2B5EF4-FFF2-40B4-BE49-F238E27FC236}">
-                <a16:creationId xmlns:a16="http://schemas.microsoft.com/office/drawing/2014/main" id="{9E670DBB-2F94-4252-A2B1-1D64A8E4A266}"/>
-              </a:ext>
-            </a:extLst>
-          </p:cNvPr>
-          <p:cNvPicPr>
-            <a:picLocks noChangeAspect="1"/>
-          </p:cNvPicPr>
-          <p:nvPr/>
-        </p:nvPicPr>
-        <p:blipFill>
-          <a:blip r:embed="rId6">
-            <a:extLst>
-              <a:ext uri="{28A0092B-C50C-407E-A947-70E740481C1C}">
-                <a14:useLocalDpi xmlns:a14="http://schemas.microsoft.com/office/drawing/2010/main" val="0"/>
-              </a:ext>
-            </a:extLst>
-          </a:blip>
-          <a:stretch>
-            <a:fillRect/>
-          </a:stretch>
-        </p:blipFill>
-        <p:spPr>
-          <a:xfrm>
-            <a:off x="20647721" y="10810859"/>
-            <a:ext cx="6949561" cy="4909163"/>
+            <a:off x="18720057" y="3142328"/>
+            <a:ext cx="10602181" cy="2827248"/>
           </a:xfrm>
           <a:prstGeom prst="rect">
             <a:avLst/>

</xml_diff>